<commit_message>
#5 - [Agalya] - Fixed typo in ppt
</commit_message>
<xml_diff>
--- a/FinalPPT.pptx
+++ b/FinalPPT.pptx
@@ -161,7 +161,7 @@
   </p:defaultTextStyle>
   <p:extLst>
     <p:ext uri="{EFAFB233-063F-42B5-8137-9DF3F51BA10A}">
-      <p15:sldGuideLst xmlns="" xmlns:p15="http://schemas.microsoft.com/office/powerpoint/2012/main">
+      <p15:sldGuideLst xmlns:p15="http://schemas.microsoft.com/office/powerpoint/2012/main">
         <p15:guide id="1" orient="horz" pos="2160">
           <p15:clr>
             <a:srgbClr val="A4A3A4"/>
@@ -175,7 +175,7 @@
       </p15:sldGuideLst>
     </p:ext>
     <p:ext uri="{2D200454-40CA-4A62-9FC3-DE9A4176ACB9}">
-      <p15:notesGuideLst xmlns="" xmlns:p15="http://schemas.microsoft.com/office/powerpoint/2012/main">
+      <p15:notesGuideLst xmlns:p15="http://schemas.microsoft.com/office/powerpoint/2012/main">
         <p15:guide id="1" orient="horz" pos="2928">
           <p15:clr>
             <a:srgbClr val="A4A3A4"/>
@@ -2576,7 +2576,7 @@
   <dgm:whole/>
   <dgm:extLst>
     <a:ext uri="http://schemas.microsoft.com/office/drawing/2008/diagram">
-      <dsp:dataModelExt xmlns:dsp="http://schemas.microsoft.com/office/drawing/2008/diagram" xmlns="" relId="rId6" minVer="http://schemas.openxmlformats.org/drawingml/2006/diagram"/>
+      <dsp:dataModelExt xmlns:dsp="http://schemas.microsoft.com/office/drawing/2008/diagram" relId="rId6" minVer="http://schemas.openxmlformats.org/drawingml/2006/diagram"/>
     </a:ext>
   </dgm:extLst>
 </dgm:dataModel>
@@ -2953,25 +2953,25 @@
     </dgm:pt>
   </dgm:ptLst>
   <dgm:cxnLst>
-    <dgm:cxn modelId="{7B89FD2F-C8FF-4316-BBE2-8A645B207DDB}" type="presOf" srcId="{F20A51B1-3353-4E5D-B4AD-329714CCE184}" destId="{7B0D8C10-943B-4A12-B2E7-334C43B1CBC2}" srcOrd="0" destOrd="0" presId="urn:microsoft.com/office/officeart/2005/8/layout/process2"/>
-    <dgm:cxn modelId="{4115945F-87B7-4188-AA66-245ACAFC11B0}" type="presOf" srcId="{0732DB4F-12D8-4D7C-B951-5E130DBD24C0}" destId="{BC0148E8-F23A-45D5-A145-E2808A05DB9D}" srcOrd="1" destOrd="0" presId="urn:microsoft.com/office/officeart/2005/8/layout/process2"/>
-    <dgm:cxn modelId="{260F979A-C743-40D5-9CEB-8EEDF01E54D1}" type="presOf" srcId="{6B52B9B0-D4C5-43B5-AADB-CC7EFB6FF5C5}" destId="{AE94E800-5286-4189-8072-63BF912AF84B}" srcOrd="0" destOrd="0" presId="urn:microsoft.com/office/officeart/2005/8/layout/process2"/>
+    <dgm:cxn modelId="{306ED7F8-48F4-4A33-8E5B-2ED862A31CE9}" type="presOf" srcId="{901D3352-E8C0-44F3-AC35-A4BE74EDCD91}" destId="{122423AD-31E2-40D8-BAA3-5BF0935A4860}" srcOrd="0" destOrd="0" presId="urn:microsoft.com/office/officeart/2005/8/layout/process2"/>
+    <dgm:cxn modelId="{70C3F5A8-84C4-4D57-A2B5-726EC3C59457}" type="presOf" srcId="{6B52B9B0-D4C5-43B5-AADB-CC7EFB6FF5C5}" destId="{DDAC42F0-8BFC-473C-8C69-5EF503DC40DC}" srcOrd="1" destOrd="0" presId="urn:microsoft.com/office/officeart/2005/8/layout/process2"/>
     <dgm:cxn modelId="{7974F6A0-46A5-419C-ADEB-E54F8D170277}" srcId="{7566535B-809E-4B57-AE7A-1F19BDF04526}" destId="{007A1E10-7957-4E64-B950-ECBA725298E4}" srcOrd="0" destOrd="0" parTransId="{58E681F0-B86D-4031-A0D7-DA8AAE2F8ED9}" sibTransId="{6B52B9B0-D4C5-43B5-AADB-CC7EFB6FF5C5}"/>
     <dgm:cxn modelId="{25BFC0CD-85CF-4FE7-97DC-A78CBBCB8FBD}" type="presOf" srcId="{901D3352-E8C0-44F3-AC35-A4BE74EDCD91}" destId="{60AC58B5-36E5-4920-BFD7-DFAD1F7E822C}" srcOrd="1" destOrd="0" presId="urn:microsoft.com/office/officeart/2005/8/layout/process2"/>
+    <dgm:cxn modelId="{19FB7C54-1DC0-4763-BDB2-873D4D870E5B}" srcId="{7566535B-809E-4B57-AE7A-1F19BDF04526}" destId="{7F4DCD7F-35DC-4B78-8901-A82699A25E55}" srcOrd="3" destOrd="0" parTransId="{D9D08C3A-D5E9-4B85-BA10-7327300D2A54}" sibTransId="{0732DB4F-12D8-4D7C-B951-5E130DBD24C0}"/>
+    <dgm:cxn modelId="{A9AB01C8-4A63-44D7-9307-96B6868061F1}" type="presOf" srcId="{B760676C-1AC3-427C-A5D0-49894A1A4634}" destId="{AC2D1200-2BE5-4021-8C6C-1C35B052A441}" srcOrd="0" destOrd="0" presId="urn:microsoft.com/office/officeart/2005/8/layout/process2"/>
+    <dgm:cxn modelId="{7B89FD2F-C8FF-4316-BBE2-8A645B207DDB}" type="presOf" srcId="{F20A51B1-3353-4E5D-B4AD-329714CCE184}" destId="{7B0D8C10-943B-4A12-B2E7-334C43B1CBC2}" srcOrd="0" destOrd="0" presId="urn:microsoft.com/office/officeart/2005/8/layout/process2"/>
+    <dgm:cxn modelId="{260F979A-C743-40D5-9CEB-8EEDF01E54D1}" type="presOf" srcId="{6B52B9B0-D4C5-43B5-AADB-CC7EFB6FF5C5}" destId="{AE94E800-5286-4189-8072-63BF912AF84B}" srcOrd="0" destOrd="0" presId="urn:microsoft.com/office/officeart/2005/8/layout/process2"/>
+    <dgm:cxn modelId="{A28F8E7C-DE21-4F46-AC2A-C10972946C82}" type="presOf" srcId="{9E6ADF91-3A25-401C-A3C1-0BA2B613CB28}" destId="{BC3121E8-7D09-4D02-B7DA-1BC472F40F2E}" srcOrd="0" destOrd="0" presId="urn:microsoft.com/office/officeart/2005/8/layout/process2"/>
+    <dgm:cxn modelId="{3D27A7E6-2057-42B8-AF08-B9A6E218984C}" type="presOf" srcId="{7566535B-809E-4B57-AE7A-1F19BDF04526}" destId="{F478C2C9-CBCA-4C05-ADA7-BE333A665695}" srcOrd="0" destOrd="0" presId="urn:microsoft.com/office/officeart/2005/8/layout/process2"/>
+    <dgm:cxn modelId="{D7FD4A90-B08B-40DA-8EEF-A29744CC8F36}" srcId="{7566535B-809E-4B57-AE7A-1F19BDF04526}" destId="{B760676C-1AC3-427C-A5D0-49894A1A4634}" srcOrd="1" destOrd="0" parTransId="{8C947102-C1A1-4B87-B13D-2B4E08912F23}" sibTransId="{901D3352-E8C0-44F3-AC35-A4BE74EDCD91}"/>
+    <dgm:cxn modelId="{11EFBFBD-109F-4ABA-BF68-BFD2537A6E43}" srcId="{7566535B-809E-4B57-AE7A-1F19BDF04526}" destId="{F20A51B1-3353-4E5D-B4AD-329714CCE184}" srcOrd="2" destOrd="0" parTransId="{25FD7FF0-F0C7-4F5A-AB3A-C9D52D84EBBF}" sibTransId="{9E6ADF91-3A25-401C-A3C1-0BA2B613CB28}"/>
+    <dgm:cxn modelId="{A11A2C99-51AE-44A9-A22B-626A24972738}" type="presOf" srcId="{7F4DCD7F-35DC-4B78-8901-A82699A25E55}" destId="{B189ABA4-8F33-44E6-A1E1-B099A0E05B61}" srcOrd="0" destOrd="0" presId="urn:microsoft.com/office/officeart/2005/8/layout/process2"/>
+    <dgm:cxn modelId="{1C12B8BB-227C-4FF0-A0D5-A025C7D60E62}" type="presOf" srcId="{7E5FBE2F-E570-48D8-BBD2-EA39B3CACD02}" destId="{9EECF936-C517-4E19-984A-7DD56A0C956F}" srcOrd="0" destOrd="0" presId="urn:microsoft.com/office/officeart/2005/8/layout/process2"/>
+    <dgm:cxn modelId="{4115945F-87B7-4188-AA66-245ACAFC11B0}" type="presOf" srcId="{0732DB4F-12D8-4D7C-B951-5E130DBD24C0}" destId="{BC0148E8-F23A-45D5-A145-E2808A05DB9D}" srcOrd="1" destOrd="0" presId="urn:microsoft.com/office/officeart/2005/8/layout/process2"/>
+    <dgm:cxn modelId="{114BABD3-CDF7-4161-BCC2-805CE4B90813}" type="presOf" srcId="{9E6ADF91-3A25-401C-A3C1-0BA2B613CB28}" destId="{F5C58D87-5263-40AE-9F30-F7394FE92B01}" srcOrd="1" destOrd="0" presId="urn:microsoft.com/office/officeart/2005/8/layout/process2"/>
     <dgm:cxn modelId="{D44A259F-4D0B-45A8-BB75-F0A376DE9101}" srcId="{7566535B-809E-4B57-AE7A-1F19BDF04526}" destId="{7E5FBE2F-E570-48D8-BBD2-EA39B3CACD02}" srcOrd="4" destOrd="0" parTransId="{56691656-DEEC-4651-AEF4-1086A97C83D3}" sibTransId="{010A2F28-D3B7-45A9-8EBE-BA63737F1D5E}"/>
-    <dgm:cxn modelId="{A9AB01C8-4A63-44D7-9307-96B6868061F1}" type="presOf" srcId="{B760676C-1AC3-427C-A5D0-49894A1A4634}" destId="{AC2D1200-2BE5-4021-8C6C-1C35B052A441}" srcOrd="0" destOrd="0" presId="urn:microsoft.com/office/officeart/2005/8/layout/process2"/>
-    <dgm:cxn modelId="{70C3F5A8-84C4-4D57-A2B5-726EC3C59457}" type="presOf" srcId="{6B52B9B0-D4C5-43B5-AADB-CC7EFB6FF5C5}" destId="{DDAC42F0-8BFC-473C-8C69-5EF503DC40DC}" srcOrd="1" destOrd="0" presId="urn:microsoft.com/office/officeart/2005/8/layout/process2"/>
-    <dgm:cxn modelId="{19FB7C54-1DC0-4763-BDB2-873D4D870E5B}" srcId="{7566535B-809E-4B57-AE7A-1F19BDF04526}" destId="{7F4DCD7F-35DC-4B78-8901-A82699A25E55}" srcOrd="3" destOrd="0" parTransId="{D9D08C3A-D5E9-4B85-BA10-7327300D2A54}" sibTransId="{0732DB4F-12D8-4D7C-B951-5E130DBD24C0}"/>
-    <dgm:cxn modelId="{1C12B8BB-227C-4FF0-A0D5-A025C7D60E62}" type="presOf" srcId="{7E5FBE2F-E570-48D8-BBD2-EA39B3CACD02}" destId="{9EECF936-C517-4E19-984A-7DD56A0C956F}" srcOrd="0" destOrd="0" presId="urn:microsoft.com/office/officeart/2005/8/layout/process2"/>
-    <dgm:cxn modelId="{3D27A7E6-2057-42B8-AF08-B9A6E218984C}" type="presOf" srcId="{7566535B-809E-4B57-AE7A-1F19BDF04526}" destId="{F478C2C9-CBCA-4C05-ADA7-BE333A665695}" srcOrd="0" destOrd="0" presId="urn:microsoft.com/office/officeart/2005/8/layout/process2"/>
+    <dgm:cxn modelId="{4DC685D6-2533-420C-A47D-8D10D60BF8B4}" type="presOf" srcId="{007A1E10-7957-4E64-B950-ECBA725298E4}" destId="{A0CAF96B-EC41-4C06-9B98-D75AD3336425}" srcOrd="0" destOrd="0" presId="urn:microsoft.com/office/officeart/2005/8/layout/process2"/>
     <dgm:cxn modelId="{B85D323F-7B29-4281-A09B-FE41E24B320B}" type="presOf" srcId="{0732DB4F-12D8-4D7C-B951-5E130DBD24C0}" destId="{B83FA8B6-DDD8-4FEE-915D-331F42DFFFC7}" srcOrd="0" destOrd="0" presId="urn:microsoft.com/office/officeart/2005/8/layout/process2"/>
-    <dgm:cxn modelId="{114BABD3-CDF7-4161-BCC2-805CE4B90813}" type="presOf" srcId="{9E6ADF91-3A25-401C-A3C1-0BA2B613CB28}" destId="{F5C58D87-5263-40AE-9F30-F7394FE92B01}" srcOrd="1" destOrd="0" presId="urn:microsoft.com/office/officeart/2005/8/layout/process2"/>
-    <dgm:cxn modelId="{306ED7F8-48F4-4A33-8E5B-2ED862A31CE9}" type="presOf" srcId="{901D3352-E8C0-44F3-AC35-A4BE74EDCD91}" destId="{122423AD-31E2-40D8-BAA3-5BF0935A4860}" srcOrd="0" destOrd="0" presId="urn:microsoft.com/office/officeart/2005/8/layout/process2"/>
-    <dgm:cxn modelId="{D7FD4A90-B08B-40DA-8EEF-A29744CC8F36}" srcId="{7566535B-809E-4B57-AE7A-1F19BDF04526}" destId="{B760676C-1AC3-427C-A5D0-49894A1A4634}" srcOrd="1" destOrd="0" parTransId="{8C947102-C1A1-4B87-B13D-2B4E08912F23}" sibTransId="{901D3352-E8C0-44F3-AC35-A4BE74EDCD91}"/>
-    <dgm:cxn modelId="{4DC685D6-2533-420C-A47D-8D10D60BF8B4}" type="presOf" srcId="{007A1E10-7957-4E64-B950-ECBA725298E4}" destId="{A0CAF96B-EC41-4C06-9B98-D75AD3336425}" srcOrd="0" destOrd="0" presId="urn:microsoft.com/office/officeart/2005/8/layout/process2"/>
-    <dgm:cxn modelId="{A28F8E7C-DE21-4F46-AC2A-C10972946C82}" type="presOf" srcId="{9E6ADF91-3A25-401C-A3C1-0BA2B613CB28}" destId="{BC3121E8-7D09-4D02-B7DA-1BC472F40F2E}" srcOrd="0" destOrd="0" presId="urn:microsoft.com/office/officeart/2005/8/layout/process2"/>
-    <dgm:cxn modelId="{A11A2C99-51AE-44A9-A22B-626A24972738}" type="presOf" srcId="{7F4DCD7F-35DC-4B78-8901-A82699A25E55}" destId="{B189ABA4-8F33-44E6-A1E1-B099A0E05B61}" srcOrd="0" destOrd="0" presId="urn:microsoft.com/office/officeart/2005/8/layout/process2"/>
-    <dgm:cxn modelId="{11EFBFBD-109F-4ABA-BF68-BFD2537A6E43}" srcId="{7566535B-809E-4B57-AE7A-1F19BDF04526}" destId="{F20A51B1-3353-4E5D-B4AD-329714CCE184}" srcOrd="2" destOrd="0" parTransId="{25FD7FF0-F0C7-4F5A-AB3A-C9D52D84EBBF}" sibTransId="{9E6ADF91-3A25-401C-A3C1-0BA2B613CB28}"/>
     <dgm:cxn modelId="{E8F8B499-4FBA-49CA-8760-73B7F0F66691}" type="presParOf" srcId="{F478C2C9-CBCA-4C05-ADA7-BE333A665695}" destId="{A0CAF96B-EC41-4C06-9B98-D75AD3336425}" srcOrd="0" destOrd="0" presId="urn:microsoft.com/office/officeart/2005/8/layout/process2"/>
     <dgm:cxn modelId="{5978A473-8D5F-4DED-B3DF-C80AEE851E54}" type="presParOf" srcId="{F478C2C9-CBCA-4C05-ADA7-BE333A665695}" destId="{AE94E800-5286-4189-8072-63BF912AF84B}" srcOrd="1" destOrd="0" presId="urn:microsoft.com/office/officeart/2005/8/layout/process2"/>
     <dgm:cxn modelId="{02420E27-DEFF-4D0F-9005-62BB352D714A}" type="presParOf" srcId="{AE94E800-5286-4189-8072-63BF912AF84B}" destId="{DDAC42F0-8BFC-473C-8C69-5EF503DC40DC}" srcOrd="0" destOrd="0" presId="urn:microsoft.com/office/officeart/2005/8/layout/process2"/>
@@ -2989,11 +2989,11 @@
   <dgm:bg/>
   <dgm:whole/>
   <dgm:extLst>
+    <a:ext uri="http://schemas.microsoft.com/office/drawing/2008/diagram">
+      <dsp:dataModelExt xmlns:dsp="http://schemas.microsoft.com/office/drawing/2008/diagram" relId="rId11" minVer="http://schemas.openxmlformats.org/drawingml/2006/diagram"/>
+    </a:ext>
     <a:ext uri="{C62137D5-CB1D-491B-B009-E17868A290BF}">
-      <dgm14:recolorImg xmlns="" xmlns:dgm14="http://schemas.microsoft.com/office/drawing/2010/diagram" val="1"/>
-    </a:ext>
-    <a:ext uri="http://schemas.microsoft.com/office/drawing/2008/diagram">
-      <dsp:dataModelExt xmlns:dsp="http://schemas.microsoft.com/office/drawing/2008/diagram" xmlns="" relId="rId11" minVer="http://schemas.openxmlformats.org/drawingml/2006/diagram"/>
+      <dgm14:recolorImg xmlns:dgm14="http://schemas.microsoft.com/office/drawing/2010/diagram" val="1"/>
     </a:ext>
   </dgm:extLst>
 </dgm:dataModel>
@@ -3077,14 +3077,14 @@
   <dgm:whole/>
   <dgm:extLst>
     <a:ext uri="http://schemas.microsoft.com/office/drawing/2008/diagram">
-      <dsp:dataModelExt xmlns:dsp="http://schemas.microsoft.com/office/drawing/2008/diagram" xmlns="" relId="rId16" minVer="http://schemas.openxmlformats.org/drawingml/2006/diagram"/>
+      <dsp:dataModelExt xmlns:dsp="http://schemas.microsoft.com/office/drawing/2008/diagram" relId="rId16" minVer="http://schemas.openxmlformats.org/drawingml/2006/diagram"/>
     </a:ext>
   </dgm:extLst>
 </dgm:dataModel>
 </file>
 
 <file path=ppt/diagrams/drawing1.xml><?xml version="1.0" encoding="utf-8"?>
-<dsp:drawing xmlns:dgm="http://schemas.openxmlformats.org/drawingml/2006/diagram" xmlns:a="http://schemas.openxmlformats.org/drawingml/2006/main" xmlns:dsp="http://schemas.microsoft.com/office/drawing/2008/diagram">
+<dsp:drawing xmlns:dgm="http://schemas.openxmlformats.org/drawingml/2006/diagram" xmlns:dsp="http://schemas.microsoft.com/office/drawing/2008/diagram" xmlns:a="http://schemas.openxmlformats.org/drawingml/2006/main">
   <dsp:spTree>
     <dsp:nvGrpSpPr>
       <dsp:cNvPr id="0" name=""/>
@@ -3096,7 +3096,7 @@
 </file>
 
 <file path=ppt/diagrams/drawing2.xml><?xml version="1.0" encoding="utf-8"?>
-<dsp:drawing xmlns:dgm="http://schemas.openxmlformats.org/drawingml/2006/diagram" xmlns:a="http://schemas.openxmlformats.org/drawingml/2006/main" xmlns:dsp="http://schemas.microsoft.com/office/drawing/2008/diagram">
+<dsp:drawing xmlns:dgm="http://schemas.openxmlformats.org/drawingml/2006/diagram" xmlns:dsp="http://schemas.microsoft.com/office/drawing/2008/diagram" xmlns:a="http://schemas.openxmlformats.org/drawingml/2006/main">
   <dsp:spTree>
     <dsp:nvGrpSpPr>
       <dsp:cNvPr id="0" name=""/>
@@ -3197,8 +3197,8 @@
         </a:p>
       </dsp:txBody>
       <dsp:txXfrm>
-        <a:off x="1541341" y="75896"/>
-        <a:ext cx="1591702" cy="745473"/>
+        <a:off x="1563175" y="97730"/>
+        <a:ext cx="1548034" cy="701805"/>
       </dsp:txXfrm>
     </dsp:sp>
     <dsp:sp modelId="{AE94E800-5286-4189-8072-63BF912AF84B}">
@@ -3265,9 +3265,9 @@
           <a:endParaRPr lang="en-US" sz="1100" kern="1200"/>
         </a:p>
       </dsp:txBody>
-      <dsp:txXfrm rot="5473807">
-        <a:off x="2214415" y="802377"/>
-        <a:ext cx="223159" cy="335463"/>
+      <dsp:txXfrm rot="-5400000">
+        <a:off x="2226075" y="858537"/>
+        <a:ext cx="201277" cy="156211"/>
       </dsp:txXfrm>
     </dsp:sp>
     <dsp:sp modelId="{AC2D1200-2BE5-4021-8C6C-1C35B052A441}">
@@ -3347,8 +3347,8 @@
         </a:p>
       </dsp:txBody>
       <dsp:txXfrm>
-        <a:off x="1518946" y="1118847"/>
-        <a:ext cx="1591702" cy="745473"/>
+        <a:off x="1540780" y="1140681"/>
+        <a:ext cx="1548034" cy="701805"/>
       </dsp:txXfrm>
     </dsp:sp>
     <dsp:sp modelId="{122423AD-31E2-40D8-BAA3-5BF0935A4860}">
@@ -3415,9 +3415,9 @@
           <a:endParaRPr lang="en-US" sz="1400" kern="1200"/>
         </a:p>
       </dsp:txBody>
-      <dsp:txXfrm rot="5400000">
-        <a:off x="2175021" y="1882958"/>
-        <a:ext cx="279552" cy="335463"/>
+      <dsp:txXfrm rot="-5400000">
+        <a:off x="2214159" y="1910913"/>
+        <a:ext cx="201277" cy="195686"/>
       </dsp:txXfrm>
     </dsp:sp>
     <dsp:sp modelId="{7B0D8C10-943B-4A12-B2E7-334C43B1CBC2}">
@@ -3497,8 +3497,8 @@
         </a:p>
       </dsp:txBody>
       <dsp:txXfrm>
-        <a:off x="1518946" y="2237058"/>
-        <a:ext cx="1591702" cy="745473"/>
+        <a:off x="1540780" y="2258892"/>
+        <a:ext cx="1548034" cy="701805"/>
       </dsp:txXfrm>
     </dsp:sp>
     <dsp:sp modelId="{BC3121E8-7D09-4D02-B7DA-1BC472F40F2E}">
@@ -3565,9 +3565,9 @@
           <a:endParaRPr lang="en-US" sz="1400" kern="1200"/>
         </a:p>
       </dsp:txBody>
-      <dsp:txXfrm rot="5400000">
-        <a:off x="2175021" y="3001168"/>
-        <a:ext cx="279552" cy="335463"/>
+      <dsp:txXfrm rot="-5400000">
+        <a:off x="2214159" y="3029123"/>
+        <a:ext cx="201277" cy="195686"/>
       </dsp:txXfrm>
     </dsp:sp>
     <dsp:sp modelId="{B189ABA4-8F33-44E6-A1E1-B099A0E05B61}">
@@ -3647,8 +3647,8 @@
         </a:p>
       </dsp:txBody>
       <dsp:txXfrm>
-        <a:off x="1518946" y="3355268"/>
-        <a:ext cx="1591702" cy="745473"/>
+        <a:off x="1540780" y="3377102"/>
+        <a:ext cx="1548034" cy="701805"/>
       </dsp:txXfrm>
     </dsp:sp>
     <dsp:sp modelId="{B83FA8B6-DDD8-4FEE-915D-331F42DFFFC7}">
@@ -3715,9 +3715,9 @@
           <a:endParaRPr lang="en-US" sz="1400" kern="1200"/>
         </a:p>
       </dsp:txBody>
-      <dsp:txXfrm rot="5400000">
-        <a:off x="2175021" y="4119379"/>
-        <a:ext cx="279552" cy="335463"/>
+      <dsp:txXfrm rot="-5400000">
+        <a:off x="2214159" y="4147334"/>
+        <a:ext cx="201277" cy="195686"/>
       </dsp:txXfrm>
     </dsp:sp>
     <dsp:sp modelId="{9EECF936-C517-4E19-984A-7DD56A0C956F}">
@@ -3797,8 +3797,8 @@
         </a:p>
       </dsp:txBody>
       <dsp:txXfrm>
-        <a:off x="1518946" y="4473479"/>
-        <a:ext cx="1591702" cy="745473"/>
+        <a:off x="1540780" y="4495313"/>
+        <a:ext cx="1548034" cy="701805"/>
       </dsp:txXfrm>
     </dsp:sp>
   </dsp:spTree>
@@ -3806,7 +3806,7 @@
 </file>
 
 <file path=ppt/diagrams/drawing3.xml><?xml version="1.0" encoding="utf-8"?>
-<dsp:drawing xmlns:dgm="http://schemas.openxmlformats.org/drawingml/2006/diagram" xmlns:a="http://schemas.openxmlformats.org/drawingml/2006/main" xmlns:dsp="http://schemas.microsoft.com/office/drawing/2008/diagram">
+<dsp:drawing xmlns:dgm="http://schemas.openxmlformats.org/drawingml/2006/diagram" xmlns:dsp="http://schemas.microsoft.com/office/drawing/2008/diagram" xmlns:a="http://schemas.openxmlformats.org/drawingml/2006/main">
   <dsp:spTree>
     <dsp:nvGrpSpPr>
       <dsp:cNvPr id="0" name=""/>
@@ -3890,8 +3890,8 @@
         </a:p>
       </dsp:txBody>
       <dsp:txXfrm>
-        <a:off x="0" y="0"/>
-        <a:ext cx="1792732" cy="893574"/>
+        <a:off x="26172" y="26172"/>
+        <a:ext cx="1740388" cy="841230"/>
       </dsp:txXfrm>
     </dsp:sp>
   </dsp:spTree>
@@ -7497,14 +7497,14 @@
           <a:effectLst/>
           <a:extLst>
             <a:ext uri="{909E8E84-426E-40DD-AFC4-6F175D3DCCD1}">
-              <a14:hiddenFill xmlns="" xmlns:a14="http://schemas.microsoft.com/office/drawing/2010/main">
+              <a14:hiddenFill xmlns:a14="http://schemas.microsoft.com/office/drawing/2010/main">
                 <a:solidFill>
                   <a:schemeClr val="accent1"/>
                 </a:solidFill>
               </a14:hiddenFill>
             </a:ext>
             <a:ext uri="{91240B29-F687-4F45-9708-019B960494DF}">
-              <a14:hiddenLine xmlns="" xmlns:a14="http://schemas.microsoft.com/office/drawing/2010/main" w="9525">
+              <a14:hiddenLine xmlns:a14="http://schemas.microsoft.com/office/drawing/2010/main" w="9525">
                 <a:solidFill>
                   <a:schemeClr val="tx1"/>
                 </a:solidFill>
@@ -7514,7 +7514,7 @@
               </a14:hiddenLine>
             </a:ext>
             <a:ext uri="{AF507438-7753-43E0-B8FC-AC1667EBCBE1}">
-              <a14:hiddenEffects xmlns="" xmlns:a14="http://schemas.microsoft.com/office/drawing/2010/main">
+              <a14:hiddenEffects xmlns:a14="http://schemas.microsoft.com/office/drawing/2010/main">
                 <a:effectLst>
                   <a:outerShdw dist="35921" dir="2700000" algn="ctr" rotWithShape="0">
                     <a:schemeClr val="bg2"/>
@@ -7568,14 +7568,14 @@
           <a:effectLst/>
           <a:extLst>
             <a:ext uri="{909E8E84-426E-40DD-AFC4-6F175D3DCCD1}">
-              <a14:hiddenFill xmlns="" xmlns:a14="http://schemas.microsoft.com/office/drawing/2010/main">
+              <a14:hiddenFill xmlns:a14="http://schemas.microsoft.com/office/drawing/2010/main">
                 <a:solidFill>
                   <a:schemeClr val="accent1"/>
                 </a:solidFill>
               </a14:hiddenFill>
             </a:ext>
             <a:ext uri="{91240B29-F687-4F45-9708-019B960494DF}">
-              <a14:hiddenLine xmlns="" xmlns:a14="http://schemas.microsoft.com/office/drawing/2010/main" w="9525">
+              <a14:hiddenLine xmlns:a14="http://schemas.microsoft.com/office/drawing/2010/main" w="9525">
                 <a:solidFill>
                   <a:schemeClr val="tx1"/>
                 </a:solidFill>
@@ -7585,7 +7585,7 @@
               </a14:hiddenLine>
             </a:ext>
             <a:ext uri="{AF507438-7753-43E0-B8FC-AC1667EBCBE1}">
-              <a14:hiddenEffects xmlns="" xmlns:a14="http://schemas.microsoft.com/office/drawing/2010/main">
+              <a14:hiddenEffects xmlns:a14="http://schemas.microsoft.com/office/drawing/2010/main">
                 <a:effectLst>
                   <a:outerShdw dist="35921" dir="2700000" algn="ctr" rotWithShape="0">
                     <a:schemeClr val="bg2"/>
@@ -7639,14 +7639,14 @@
           <a:effectLst/>
           <a:extLst>
             <a:ext uri="{909E8E84-426E-40DD-AFC4-6F175D3DCCD1}">
-              <a14:hiddenFill xmlns="" xmlns:a14="http://schemas.microsoft.com/office/drawing/2010/main">
+              <a14:hiddenFill xmlns:a14="http://schemas.microsoft.com/office/drawing/2010/main">
                 <a:solidFill>
                   <a:schemeClr val="accent1"/>
                 </a:solidFill>
               </a14:hiddenFill>
             </a:ext>
             <a:ext uri="{91240B29-F687-4F45-9708-019B960494DF}">
-              <a14:hiddenLine xmlns="" xmlns:a14="http://schemas.microsoft.com/office/drawing/2010/main" w="9525">
+              <a14:hiddenLine xmlns:a14="http://schemas.microsoft.com/office/drawing/2010/main" w="9525">
                 <a:solidFill>
                   <a:schemeClr val="tx1"/>
                 </a:solidFill>
@@ -7656,7 +7656,7 @@
               </a14:hiddenLine>
             </a:ext>
             <a:ext uri="{AF507438-7753-43E0-B8FC-AC1667EBCBE1}">
-              <a14:hiddenEffects xmlns="" xmlns:a14="http://schemas.microsoft.com/office/drawing/2010/main">
+              <a14:hiddenEffects xmlns:a14="http://schemas.microsoft.com/office/drawing/2010/main">
                 <a:effectLst>
                   <a:outerShdw dist="35921" dir="2700000" algn="ctr" rotWithShape="0">
                     <a:schemeClr val="bg2"/>
@@ -7710,14 +7710,14 @@
           <a:effectLst/>
           <a:extLst>
             <a:ext uri="{909E8E84-426E-40DD-AFC4-6F175D3DCCD1}">
-              <a14:hiddenFill xmlns="" xmlns:a14="http://schemas.microsoft.com/office/drawing/2010/main">
+              <a14:hiddenFill xmlns:a14="http://schemas.microsoft.com/office/drawing/2010/main">
                 <a:solidFill>
                   <a:schemeClr val="accent1"/>
                 </a:solidFill>
               </a14:hiddenFill>
             </a:ext>
             <a:ext uri="{91240B29-F687-4F45-9708-019B960494DF}">
-              <a14:hiddenLine xmlns="" xmlns:a14="http://schemas.microsoft.com/office/drawing/2010/main" w="9525">
+              <a14:hiddenLine xmlns:a14="http://schemas.microsoft.com/office/drawing/2010/main" w="9525">
                 <a:solidFill>
                   <a:schemeClr val="tx1"/>
                 </a:solidFill>
@@ -7727,7 +7727,7 @@
               </a14:hiddenLine>
             </a:ext>
             <a:ext uri="{AF507438-7753-43E0-B8FC-AC1667EBCBE1}">
-              <a14:hiddenEffects xmlns="" xmlns:a14="http://schemas.microsoft.com/office/drawing/2010/main">
+              <a14:hiddenEffects xmlns:a14="http://schemas.microsoft.com/office/drawing/2010/main">
                 <a:effectLst>
                   <a:outerShdw dist="35921" dir="2700000" algn="ctr" rotWithShape="0">
                     <a:schemeClr val="bg2"/>
@@ -7764,7 +7764,7 @@
     </p:spTree>
     <p:extLst>
       <p:ext uri="{BB962C8B-B14F-4D97-AF65-F5344CB8AC3E}">
-        <p14:creationId xmlns="" xmlns:p14="http://schemas.microsoft.com/office/powerpoint/2010/main" val="3979472258"/>
+        <p14:creationId xmlns:p14="http://schemas.microsoft.com/office/powerpoint/2010/main" val="3979472258"/>
       </p:ext>
     </p:extLst>
   </p:cSld>
@@ -7822,14 +7822,14 @@
           <a:effectLst/>
           <a:extLst>
             <a:ext uri="{909E8E84-426E-40DD-AFC4-6F175D3DCCD1}">
-              <a14:hiddenFill xmlns="" xmlns:a14="http://schemas.microsoft.com/office/drawing/2010/main">
+              <a14:hiddenFill xmlns:a14="http://schemas.microsoft.com/office/drawing/2010/main">
                 <a:solidFill>
                   <a:schemeClr val="accent1"/>
                 </a:solidFill>
               </a14:hiddenFill>
             </a:ext>
             <a:ext uri="{91240B29-F687-4F45-9708-019B960494DF}">
-              <a14:hiddenLine xmlns="" xmlns:a14="http://schemas.microsoft.com/office/drawing/2010/main" w="9525">
+              <a14:hiddenLine xmlns:a14="http://schemas.microsoft.com/office/drawing/2010/main" w="9525">
                 <a:solidFill>
                   <a:schemeClr val="tx1"/>
                 </a:solidFill>
@@ -7839,7 +7839,7 @@
               </a14:hiddenLine>
             </a:ext>
             <a:ext uri="{AF507438-7753-43E0-B8FC-AC1667EBCBE1}">
-              <a14:hiddenEffects xmlns="" xmlns:a14="http://schemas.microsoft.com/office/drawing/2010/main">
+              <a14:hiddenEffects xmlns:a14="http://schemas.microsoft.com/office/drawing/2010/main">
                 <a:effectLst>
                   <a:outerShdw dist="35921" dir="2700000" algn="ctr" rotWithShape="0">
                     <a:schemeClr val="bg2"/>
@@ -7893,14 +7893,14 @@
           <a:effectLst/>
           <a:extLst>
             <a:ext uri="{909E8E84-426E-40DD-AFC4-6F175D3DCCD1}">
-              <a14:hiddenFill xmlns="" xmlns:a14="http://schemas.microsoft.com/office/drawing/2010/main">
+              <a14:hiddenFill xmlns:a14="http://schemas.microsoft.com/office/drawing/2010/main">
                 <a:solidFill>
                   <a:schemeClr val="accent1"/>
                 </a:solidFill>
               </a14:hiddenFill>
             </a:ext>
             <a:ext uri="{91240B29-F687-4F45-9708-019B960494DF}">
-              <a14:hiddenLine xmlns="" xmlns:a14="http://schemas.microsoft.com/office/drawing/2010/main" w="9525">
+              <a14:hiddenLine xmlns:a14="http://schemas.microsoft.com/office/drawing/2010/main" w="9525">
                 <a:solidFill>
                   <a:schemeClr val="tx1"/>
                 </a:solidFill>
@@ -7910,7 +7910,7 @@
               </a14:hiddenLine>
             </a:ext>
             <a:ext uri="{AF507438-7753-43E0-B8FC-AC1667EBCBE1}">
-              <a14:hiddenEffects xmlns="" xmlns:a14="http://schemas.microsoft.com/office/drawing/2010/main">
+              <a14:hiddenEffects xmlns:a14="http://schemas.microsoft.com/office/drawing/2010/main">
                 <a:effectLst>
                   <a:outerShdw dist="35921" dir="2700000" algn="ctr" rotWithShape="0">
                     <a:schemeClr val="bg2"/>
@@ -7969,7 +7969,7 @@
           <a:effectLst/>
           <a:extLst>
             <a:ext uri="{AF507438-7753-43E0-B8FC-AC1667EBCBE1}">
-              <a14:hiddenEffects xmlns="" xmlns:a14="http://schemas.microsoft.com/office/drawing/2010/main">
+              <a14:hiddenEffects xmlns:a14="http://schemas.microsoft.com/office/drawing/2010/main">
                 <a:effectLst>
                   <a:outerShdw dist="35921" dir="2700000" algn="ctr" rotWithShape="0">
                     <a:srgbClr val="808080"/>
@@ -7978,7 +7978,7 @@
               </a14:hiddenEffects>
             </a:ext>
             <a:ext uri="{53640926-AAD7-44D8-BBD7-CCE9431645EC}">
-              <a14:shadowObscured xmlns="" xmlns:a14="http://schemas.microsoft.com/office/drawing/2010/main" val="1"/>
+              <a14:shadowObscured xmlns:a14="http://schemas.microsoft.com/office/drawing/2010/main" val="1"/>
             </a:ext>
           </a:extLst>
         </p:spPr>
@@ -8008,14 +8008,14 @@
           <a:effectLst/>
           <a:extLst>
             <a:ext uri="{909E8E84-426E-40DD-AFC4-6F175D3DCCD1}">
-              <a14:hiddenFill xmlns="" xmlns:a14="http://schemas.microsoft.com/office/drawing/2010/main">
+              <a14:hiddenFill xmlns:a14="http://schemas.microsoft.com/office/drawing/2010/main">
                 <a:solidFill>
                   <a:schemeClr val="accent1"/>
                 </a:solidFill>
               </a14:hiddenFill>
             </a:ext>
             <a:ext uri="{91240B29-F687-4F45-9708-019B960494DF}">
-              <a14:hiddenLine xmlns="" xmlns:a14="http://schemas.microsoft.com/office/drawing/2010/main" w="9525">
+              <a14:hiddenLine xmlns:a14="http://schemas.microsoft.com/office/drawing/2010/main" w="9525">
                 <a:solidFill>
                   <a:schemeClr val="tx1"/>
                 </a:solidFill>
@@ -8025,7 +8025,7 @@
               </a14:hiddenLine>
             </a:ext>
             <a:ext uri="{AF507438-7753-43E0-B8FC-AC1667EBCBE1}">
-              <a14:hiddenEffects xmlns="" xmlns:a14="http://schemas.microsoft.com/office/drawing/2010/main">
+              <a14:hiddenEffects xmlns:a14="http://schemas.microsoft.com/office/drawing/2010/main">
                 <a:effectLst>
                   <a:outerShdw dist="35921" dir="2700000" algn="ctr" rotWithShape="0">
                     <a:schemeClr val="bg2"/>
@@ -8104,14 +8104,14 @@
           <a:effectLst/>
           <a:extLst>
             <a:ext uri="{909E8E84-426E-40DD-AFC4-6F175D3DCCD1}">
-              <a14:hiddenFill xmlns="" xmlns:a14="http://schemas.microsoft.com/office/drawing/2010/main">
+              <a14:hiddenFill xmlns:a14="http://schemas.microsoft.com/office/drawing/2010/main">
                 <a:solidFill>
                   <a:schemeClr val="accent1"/>
                 </a:solidFill>
               </a14:hiddenFill>
             </a:ext>
             <a:ext uri="{91240B29-F687-4F45-9708-019B960494DF}">
-              <a14:hiddenLine xmlns="" xmlns:a14="http://schemas.microsoft.com/office/drawing/2010/main" w="9525">
+              <a14:hiddenLine xmlns:a14="http://schemas.microsoft.com/office/drawing/2010/main" w="9525">
                 <a:solidFill>
                   <a:schemeClr val="tx1"/>
                 </a:solidFill>
@@ -8121,7 +8121,7 @@
               </a14:hiddenLine>
             </a:ext>
             <a:ext uri="{AF507438-7753-43E0-B8FC-AC1667EBCBE1}">
-              <a14:hiddenEffects xmlns="" xmlns:a14="http://schemas.microsoft.com/office/drawing/2010/main">
+              <a14:hiddenEffects xmlns:a14="http://schemas.microsoft.com/office/drawing/2010/main">
                 <a:effectLst>
                   <a:outerShdw dist="35921" dir="2700000" algn="ctr" rotWithShape="0">
                     <a:schemeClr val="bg2"/>
@@ -8175,14 +8175,14 @@
           <a:effectLst/>
           <a:extLst>
             <a:ext uri="{909E8E84-426E-40DD-AFC4-6F175D3DCCD1}">
-              <a14:hiddenFill xmlns="" xmlns:a14="http://schemas.microsoft.com/office/drawing/2010/main">
+              <a14:hiddenFill xmlns:a14="http://schemas.microsoft.com/office/drawing/2010/main">
                 <a:solidFill>
                   <a:schemeClr val="accent1"/>
                 </a:solidFill>
               </a14:hiddenFill>
             </a:ext>
             <a:ext uri="{91240B29-F687-4F45-9708-019B960494DF}">
-              <a14:hiddenLine xmlns="" xmlns:a14="http://schemas.microsoft.com/office/drawing/2010/main" w="9525">
+              <a14:hiddenLine xmlns:a14="http://schemas.microsoft.com/office/drawing/2010/main" w="9525">
                 <a:solidFill>
                   <a:schemeClr val="tx1"/>
                 </a:solidFill>
@@ -8192,7 +8192,7 @@
               </a14:hiddenLine>
             </a:ext>
             <a:ext uri="{AF507438-7753-43E0-B8FC-AC1667EBCBE1}">
-              <a14:hiddenEffects xmlns="" xmlns:a14="http://schemas.microsoft.com/office/drawing/2010/main">
+              <a14:hiddenEffects xmlns:a14="http://schemas.microsoft.com/office/drawing/2010/main">
                 <a:effectLst>
                   <a:outerShdw dist="35921" dir="2700000" algn="ctr" rotWithShape="0">
                     <a:schemeClr val="bg2"/>
@@ -8229,7 +8229,7 @@
     </p:spTree>
     <p:extLst>
       <p:ext uri="{BB962C8B-B14F-4D97-AF65-F5344CB8AC3E}">
-        <p14:creationId xmlns="" xmlns:p14="http://schemas.microsoft.com/office/powerpoint/2010/main" val="2279949868"/>
+        <p14:creationId xmlns:p14="http://schemas.microsoft.com/office/powerpoint/2010/main" val="2279949868"/>
       </p:ext>
     </p:extLst>
   </p:cSld>
@@ -8438,7 +8438,7 @@
     </p:spTree>
     <p:extLst>
       <p:ext uri="{BB962C8B-B14F-4D97-AF65-F5344CB8AC3E}">
-        <p14:creationId xmlns="" xmlns:p14="http://schemas.microsoft.com/office/powerpoint/2010/main" val="3960373828"/>
+        <p14:creationId xmlns:p14="http://schemas.microsoft.com/office/powerpoint/2010/main" val="3960373828"/>
       </p:ext>
     </p:extLst>
   </p:cSld>
@@ -8527,7 +8527,7 @@
     </p:spTree>
     <p:extLst>
       <p:ext uri="{BB962C8B-B14F-4D97-AF65-F5344CB8AC3E}">
-        <p14:creationId xmlns="" xmlns:p14="http://schemas.microsoft.com/office/powerpoint/2010/main" val="3744816936"/>
+        <p14:creationId xmlns:p14="http://schemas.microsoft.com/office/powerpoint/2010/main" val="3744816936"/>
       </p:ext>
     </p:extLst>
   </p:cSld>
@@ -8616,7 +8616,7 @@
     </p:spTree>
     <p:extLst>
       <p:ext uri="{BB962C8B-B14F-4D97-AF65-F5344CB8AC3E}">
-        <p14:creationId xmlns="" xmlns:p14="http://schemas.microsoft.com/office/powerpoint/2010/main" val="2390727992"/>
+        <p14:creationId xmlns:p14="http://schemas.microsoft.com/office/powerpoint/2010/main" val="2390727992"/>
       </p:ext>
     </p:extLst>
   </p:cSld>
@@ -8705,7 +8705,7 @@
     </p:spTree>
     <p:extLst>
       <p:ext uri="{BB962C8B-B14F-4D97-AF65-F5344CB8AC3E}">
-        <p14:creationId xmlns="" xmlns:p14="http://schemas.microsoft.com/office/powerpoint/2010/main" val="1157916371"/>
+        <p14:creationId xmlns:p14="http://schemas.microsoft.com/office/powerpoint/2010/main" val="1157916371"/>
       </p:ext>
     </p:extLst>
   </p:cSld>
@@ -8794,7 +8794,7 @@
     </p:spTree>
     <p:extLst>
       <p:ext uri="{BB962C8B-B14F-4D97-AF65-F5344CB8AC3E}">
-        <p14:creationId xmlns="" xmlns:p14="http://schemas.microsoft.com/office/powerpoint/2010/main" val="2426773524"/>
+        <p14:creationId xmlns:p14="http://schemas.microsoft.com/office/powerpoint/2010/main" val="2426773524"/>
       </p:ext>
     </p:extLst>
   </p:cSld>
@@ -8883,7 +8883,7 @@
     </p:spTree>
     <p:extLst>
       <p:ext uri="{BB962C8B-B14F-4D97-AF65-F5344CB8AC3E}">
-        <p14:creationId xmlns="" xmlns:p14="http://schemas.microsoft.com/office/powerpoint/2010/main" val="695519860"/>
+        <p14:creationId xmlns:p14="http://schemas.microsoft.com/office/powerpoint/2010/main" val="695519860"/>
       </p:ext>
     </p:extLst>
   </p:cSld>
@@ -8930,7 +8930,7 @@
           <a:blip r:embed="rId2" cstate="print">
             <a:extLst>
               <a:ext uri="{28A0092B-C50C-407E-A947-70E740481C1C}">
-                <a14:useLocalDpi xmlns="" xmlns:a14="http://schemas.microsoft.com/office/drawing/2010/main" val="0"/>
+                <a14:useLocalDpi xmlns:a14="http://schemas.microsoft.com/office/drawing/2010/main" val="0"/>
               </a:ext>
             </a:extLst>
           </a:blip>
@@ -8950,7 +8950,7 @@
           <a:noFill/>
           <a:extLst>
             <a:ext uri="{909E8E84-426E-40DD-AFC4-6F175D3DCCD1}">
-              <a14:hiddenFill xmlns="" xmlns:a14="http://schemas.microsoft.com/office/drawing/2010/main">
+              <a14:hiddenFill xmlns:a14="http://schemas.microsoft.com/office/drawing/2010/main">
                 <a:solidFill>
                   <a:srgbClr val="FFFFFF"/>
                 </a:solidFill>
@@ -9179,7 +9179,7 @@
     </p:spTree>
     <p:extLst>
       <p:ext uri="{BB962C8B-B14F-4D97-AF65-F5344CB8AC3E}">
-        <p14:creationId xmlns="" xmlns:p14="http://schemas.microsoft.com/office/powerpoint/2010/main" val="3078274010"/>
+        <p14:creationId xmlns:p14="http://schemas.microsoft.com/office/powerpoint/2010/main" val="3078274010"/>
       </p:ext>
     </p:extLst>
   </p:cSld>
@@ -9317,7 +9317,7 @@
     </p:spTree>
     <p:extLst>
       <p:ext uri="{BB962C8B-B14F-4D97-AF65-F5344CB8AC3E}">
-        <p14:creationId xmlns="" xmlns:p14="http://schemas.microsoft.com/office/powerpoint/2010/main" val="2790818867"/>
+        <p14:creationId xmlns:p14="http://schemas.microsoft.com/office/powerpoint/2010/main" val="2790818867"/>
       </p:ext>
     </p:extLst>
   </p:cSld>
@@ -9447,7 +9447,7 @@
     </p:spTree>
     <p:extLst>
       <p:ext uri="{BB962C8B-B14F-4D97-AF65-F5344CB8AC3E}">
-        <p14:creationId xmlns="" xmlns:p14="http://schemas.microsoft.com/office/powerpoint/2010/main" val="3261370428"/>
+        <p14:creationId xmlns:p14="http://schemas.microsoft.com/office/powerpoint/2010/main" val="3261370428"/>
       </p:ext>
     </p:extLst>
   </p:cSld>
@@ -9560,7 +9560,7 @@
     </p:spTree>
     <p:extLst>
       <p:ext uri="{BB962C8B-B14F-4D97-AF65-F5344CB8AC3E}">
-        <p14:creationId xmlns="" xmlns:p14="http://schemas.microsoft.com/office/powerpoint/2010/main" val="1132424181"/>
+        <p14:creationId xmlns:p14="http://schemas.microsoft.com/office/powerpoint/2010/main" val="1132424181"/>
       </p:ext>
     </p:extLst>
   </p:cSld>
@@ -9690,7 +9690,7 @@
     </p:spTree>
     <p:extLst>
       <p:ext uri="{BB962C8B-B14F-4D97-AF65-F5344CB8AC3E}">
-        <p14:creationId xmlns="" xmlns:p14="http://schemas.microsoft.com/office/powerpoint/2010/main" val="349763032"/>
+        <p14:creationId xmlns:p14="http://schemas.microsoft.com/office/powerpoint/2010/main" val="349763032"/>
       </p:ext>
     </p:extLst>
   </p:cSld>
@@ -9863,7 +9863,7 @@
     </p:spTree>
     <p:extLst>
       <p:ext uri="{BB962C8B-B14F-4D97-AF65-F5344CB8AC3E}">
-        <p14:creationId xmlns="" xmlns:p14="http://schemas.microsoft.com/office/powerpoint/2010/main" val="2680569981"/>
+        <p14:creationId xmlns:p14="http://schemas.microsoft.com/office/powerpoint/2010/main" val="2680569981"/>
       </p:ext>
     </p:extLst>
   </p:cSld>
@@ -10177,7 +10177,7 @@
     </p:spTree>
     <p:extLst>
       <p:ext uri="{BB962C8B-B14F-4D97-AF65-F5344CB8AC3E}">
-        <p14:creationId xmlns="" xmlns:p14="http://schemas.microsoft.com/office/powerpoint/2010/main" val="199308405"/>
+        <p14:creationId xmlns:p14="http://schemas.microsoft.com/office/powerpoint/2010/main" val="199308405"/>
       </p:ext>
     </p:extLst>
   </p:cSld>
@@ -10230,7 +10230,7 @@
     </p:spTree>
     <p:extLst>
       <p:ext uri="{BB962C8B-B14F-4D97-AF65-F5344CB8AC3E}">
-        <p14:creationId xmlns="" xmlns:p14="http://schemas.microsoft.com/office/powerpoint/2010/main" val="1828899205"/>
+        <p14:creationId xmlns:p14="http://schemas.microsoft.com/office/powerpoint/2010/main" val="1828899205"/>
       </p:ext>
     </p:extLst>
   </p:cSld>
@@ -10260,7 +10260,7 @@
     </p:spTree>
     <p:extLst>
       <p:ext uri="{BB962C8B-B14F-4D97-AF65-F5344CB8AC3E}">
-        <p14:creationId xmlns="" xmlns:p14="http://schemas.microsoft.com/office/powerpoint/2010/main" val="51222785"/>
+        <p14:creationId xmlns:p14="http://schemas.microsoft.com/office/powerpoint/2010/main" val="51222785"/>
       </p:ext>
     </p:extLst>
   </p:cSld>
@@ -10478,7 +10478,7 @@
     </p:spTree>
     <p:extLst>
       <p:ext uri="{BB962C8B-B14F-4D97-AF65-F5344CB8AC3E}">
-        <p14:creationId xmlns="" xmlns:p14="http://schemas.microsoft.com/office/powerpoint/2010/main" val="2791311117"/>
+        <p14:creationId xmlns:p14="http://schemas.microsoft.com/office/powerpoint/2010/main" val="2791311117"/>
       </p:ext>
     </p:extLst>
   </p:cSld>
@@ -10606,7 +10606,7 @@
     </p:spTree>
     <p:extLst>
       <p:ext uri="{BB962C8B-B14F-4D97-AF65-F5344CB8AC3E}">
-        <p14:creationId xmlns="" xmlns:p14="http://schemas.microsoft.com/office/powerpoint/2010/main" val="1655414188"/>
+        <p14:creationId xmlns:p14="http://schemas.microsoft.com/office/powerpoint/2010/main" val="1655414188"/>
       </p:ext>
     </p:extLst>
   </p:cSld>
@@ -10800,7 +10800,7 @@
     </p:spTree>
     <p:extLst>
       <p:ext uri="{BB962C8B-B14F-4D97-AF65-F5344CB8AC3E}">
-        <p14:creationId xmlns="" xmlns:p14="http://schemas.microsoft.com/office/powerpoint/2010/main" val="2022706678"/>
+        <p14:creationId xmlns:p14="http://schemas.microsoft.com/office/powerpoint/2010/main" val="2022706678"/>
       </p:ext>
     </p:extLst>
   </p:cSld>
@@ -10913,7 +10913,7 @@
     </p:spTree>
     <p:extLst>
       <p:ext uri="{BB962C8B-B14F-4D97-AF65-F5344CB8AC3E}">
-        <p14:creationId xmlns="" xmlns:p14="http://schemas.microsoft.com/office/powerpoint/2010/main" val="1599155895"/>
+        <p14:creationId xmlns:p14="http://schemas.microsoft.com/office/powerpoint/2010/main" val="1599155895"/>
       </p:ext>
     </p:extLst>
   </p:cSld>
@@ -11031,7 +11031,7 @@
     </p:spTree>
     <p:extLst>
       <p:ext uri="{BB962C8B-B14F-4D97-AF65-F5344CB8AC3E}">
-        <p14:creationId xmlns="" xmlns:p14="http://schemas.microsoft.com/office/powerpoint/2010/main" val="3296267525"/>
+        <p14:creationId xmlns:p14="http://schemas.microsoft.com/office/powerpoint/2010/main" val="3296267525"/>
       </p:ext>
     </p:extLst>
   </p:cSld>
@@ -11181,7 +11181,7 @@
     </p:spTree>
     <p:extLst>
       <p:ext uri="{BB962C8B-B14F-4D97-AF65-F5344CB8AC3E}">
-        <p14:creationId xmlns="" xmlns:p14="http://schemas.microsoft.com/office/powerpoint/2010/main" val="980267061"/>
+        <p14:creationId xmlns:p14="http://schemas.microsoft.com/office/powerpoint/2010/main" val="980267061"/>
       </p:ext>
     </p:extLst>
   </p:cSld>
@@ -11371,7 +11371,7 @@
     </p:spTree>
     <p:extLst>
       <p:ext uri="{BB962C8B-B14F-4D97-AF65-F5344CB8AC3E}">
-        <p14:creationId xmlns="" xmlns:p14="http://schemas.microsoft.com/office/powerpoint/2010/main" val="2244704556"/>
+        <p14:creationId xmlns:p14="http://schemas.microsoft.com/office/powerpoint/2010/main" val="2244704556"/>
       </p:ext>
     </p:extLst>
   </p:cSld>
@@ -11696,7 +11696,7 @@
     </p:spTree>
     <p:extLst>
       <p:ext uri="{BB962C8B-B14F-4D97-AF65-F5344CB8AC3E}">
-        <p14:creationId xmlns="" xmlns:p14="http://schemas.microsoft.com/office/powerpoint/2010/main" val="833864742"/>
+        <p14:creationId xmlns:p14="http://schemas.microsoft.com/office/powerpoint/2010/main" val="833864742"/>
       </p:ext>
     </p:extLst>
   </p:cSld>
@@ -11772,7 +11772,7 @@
     </p:spTree>
     <p:extLst>
       <p:ext uri="{BB962C8B-B14F-4D97-AF65-F5344CB8AC3E}">
-        <p14:creationId xmlns="" xmlns:p14="http://schemas.microsoft.com/office/powerpoint/2010/main" val="2666272991"/>
+        <p14:creationId xmlns:p14="http://schemas.microsoft.com/office/powerpoint/2010/main" val="2666272991"/>
       </p:ext>
     </p:extLst>
   </p:cSld>
@@ -11825,7 +11825,7 @@
     </p:spTree>
     <p:extLst>
       <p:ext uri="{BB962C8B-B14F-4D97-AF65-F5344CB8AC3E}">
-        <p14:creationId xmlns="" xmlns:p14="http://schemas.microsoft.com/office/powerpoint/2010/main" val="3431224194"/>
+        <p14:creationId xmlns:p14="http://schemas.microsoft.com/office/powerpoint/2010/main" val="3431224194"/>
       </p:ext>
     </p:extLst>
   </p:cSld>
@@ -12060,7 +12060,7 @@
     </p:spTree>
     <p:extLst>
       <p:ext uri="{BB962C8B-B14F-4D97-AF65-F5344CB8AC3E}">
-        <p14:creationId xmlns="" xmlns:p14="http://schemas.microsoft.com/office/powerpoint/2010/main" val="134994577"/>
+        <p14:creationId xmlns:p14="http://schemas.microsoft.com/office/powerpoint/2010/main" val="134994577"/>
       </p:ext>
     </p:extLst>
   </p:cSld>
@@ -12271,7 +12271,7 @@
     </p:spTree>
     <p:extLst>
       <p:ext uri="{BB962C8B-B14F-4D97-AF65-F5344CB8AC3E}">
-        <p14:creationId xmlns="" xmlns:p14="http://schemas.microsoft.com/office/powerpoint/2010/main" val="3795403466"/>
+        <p14:creationId xmlns:p14="http://schemas.microsoft.com/office/powerpoint/2010/main" val="3795403466"/>
       </p:ext>
     </p:extLst>
   </p:cSld>
@@ -12335,14 +12335,14 @@
           <a:effectLst/>
           <a:extLst>
             <a:ext uri="{909E8E84-426E-40DD-AFC4-6F175D3DCCD1}">
-              <a14:hiddenFill xmlns="" xmlns:a14="http://schemas.microsoft.com/office/drawing/2010/main">
+              <a14:hiddenFill xmlns:a14="http://schemas.microsoft.com/office/drawing/2010/main">
                 <a:solidFill>
                   <a:schemeClr val="accent1"/>
                 </a:solidFill>
               </a14:hiddenFill>
             </a:ext>
             <a:ext uri="{91240B29-F687-4F45-9708-019B960494DF}">
-              <a14:hiddenLine xmlns="" xmlns:a14="http://schemas.microsoft.com/office/drawing/2010/main" w="9525">
+              <a14:hiddenLine xmlns:a14="http://schemas.microsoft.com/office/drawing/2010/main" w="9525">
                 <a:solidFill>
                   <a:schemeClr val="tx1"/>
                 </a:solidFill>
@@ -12352,7 +12352,7 @@
               </a14:hiddenLine>
             </a:ext>
             <a:ext uri="{AF507438-7753-43E0-B8FC-AC1667EBCBE1}">
-              <a14:hiddenEffects xmlns="" xmlns:a14="http://schemas.microsoft.com/office/drawing/2010/main">
+              <a14:hiddenEffects xmlns:a14="http://schemas.microsoft.com/office/drawing/2010/main">
                 <a:effectLst>
                   <a:outerShdw dist="35921" dir="2700000" algn="ctr" rotWithShape="0">
                     <a:schemeClr val="bg2"/>
@@ -12403,14 +12403,14 @@
           <a:effectLst/>
           <a:extLst>
             <a:ext uri="{909E8E84-426E-40DD-AFC4-6F175D3DCCD1}">
-              <a14:hiddenFill xmlns="" xmlns:a14="http://schemas.microsoft.com/office/drawing/2010/main">
+              <a14:hiddenFill xmlns:a14="http://schemas.microsoft.com/office/drawing/2010/main">
                 <a:solidFill>
                   <a:schemeClr val="accent1"/>
                 </a:solidFill>
               </a14:hiddenFill>
             </a:ext>
             <a:ext uri="{91240B29-F687-4F45-9708-019B960494DF}">
-              <a14:hiddenLine xmlns="" xmlns:a14="http://schemas.microsoft.com/office/drawing/2010/main" w="9525">
+              <a14:hiddenLine xmlns:a14="http://schemas.microsoft.com/office/drawing/2010/main" w="9525">
                 <a:solidFill>
                   <a:schemeClr val="tx1"/>
                 </a:solidFill>
@@ -12420,7 +12420,7 @@
               </a14:hiddenLine>
             </a:ext>
             <a:ext uri="{AF507438-7753-43E0-B8FC-AC1667EBCBE1}">
-              <a14:hiddenEffects xmlns="" xmlns:a14="http://schemas.microsoft.com/office/drawing/2010/main">
+              <a14:hiddenEffects xmlns:a14="http://schemas.microsoft.com/office/drawing/2010/main">
                 <a:effectLst>
                   <a:outerShdw dist="35921" dir="2700000" algn="ctr" rotWithShape="0">
                     <a:schemeClr val="bg2"/>
@@ -12499,14 +12499,14 @@
           <a:effectLst/>
           <a:extLst>
             <a:ext uri="{909E8E84-426E-40DD-AFC4-6F175D3DCCD1}">
-              <a14:hiddenFill xmlns="" xmlns:a14="http://schemas.microsoft.com/office/drawing/2010/main">
+              <a14:hiddenFill xmlns:a14="http://schemas.microsoft.com/office/drawing/2010/main">
                 <a:solidFill>
                   <a:schemeClr val="accent1"/>
                 </a:solidFill>
               </a14:hiddenFill>
             </a:ext>
             <a:ext uri="{91240B29-F687-4F45-9708-019B960494DF}">
-              <a14:hiddenLine xmlns="" xmlns:a14="http://schemas.microsoft.com/office/drawing/2010/main" w="9525">
+              <a14:hiddenLine xmlns:a14="http://schemas.microsoft.com/office/drawing/2010/main" w="9525">
                 <a:solidFill>
                   <a:schemeClr val="tx1"/>
                 </a:solidFill>
@@ -12516,7 +12516,7 @@
               </a14:hiddenLine>
             </a:ext>
             <a:ext uri="{AF507438-7753-43E0-B8FC-AC1667EBCBE1}">
-              <a14:hiddenEffects xmlns="" xmlns:a14="http://schemas.microsoft.com/office/drawing/2010/main">
+              <a14:hiddenEffects xmlns:a14="http://schemas.microsoft.com/office/drawing/2010/main">
                 <a:effectLst>
                   <a:outerShdw dist="35921" dir="2700000" algn="ctr" rotWithShape="0">
                     <a:schemeClr val="bg2"/>
@@ -13051,14 +13051,14 @@
           <a:effectLst/>
           <a:extLst>
             <a:ext uri="{909E8E84-426E-40DD-AFC4-6F175D3DCCD1}">
-              <a14:hiddenFill xmlns="" xmlns:a14="http://schemas.microsoft.com/office/drawing/2010/main">
+              <a14:hiddenFill xmlns:a14="http://schemas.microsoft.com/office/drawing/2010/main">
                 <a:solidFill>
                   <a:schemeClr val="accent1"/>
                 </a:solidFill>
               </a14:hiddenFill>
             </a:ext>
             <a:ext uri="{91240B29-F687-4F45-9708-019B960494DF}">
-              <a14:hiddenLine xmlns="" xmlns:a14="http://schemas.microsoft.com/office/drawing/2010/main" w="9525">
+              <a14:hiddenLine xmlns:a14="http://schemas.microsoft.com/office/drawing/2010/main" w="9525">
                 <a:solidFill>
                   <a:schemeClr val="tx1"/>
                 </a:solidFill>
@@ -13068,7 +13068,7 @@
               </a14:hiddenLine>
             </a:ext>
             <a:ext uri="{AF507438-7753-43E0-B8FC-AC1667EBCBE1}">
-              <a14:hiddenEffects xmlns="" xmlns:a14="http://schemas.microsoft.com/office/drawing/2010/main">
+              <a14:hiddenEffects xmlns:a14="http://schemas.microsoft.com/office/drawing/2010/main">
                 <a:effectLst>
                   <a:outerShdw dist="35921" dir="2700000" algn="ctr" rotWithShape="0">
                     <a:schemeClr val="bg2"/>
@@ -13117,14 +13117,14 @@
           <a:effectLst/>
           <a:extLst>
             <a:ext uri="{909E8E84-426E-40DD-AFC4-6F175D3DCCD1}">
-              <a14:hiddenFill xmlns="" xmlns:a14="http://schemas.microsoft.com/office/drawing/2010/main">
+              <a14:hiddenFill xmlns:a14="http://schemas.microsoft.com/office/drawing/2010/main">
                 <a:solidFill>
                   <a:schemeClr val="accent1"/>
                 </a:solidFill>
               </a14:hiddenFill>
             </a:ext>
             <a:ext uri="{91240B29-F687-4F45-9708-019B960494DF}">
-              <a14:hiddenLine xmlns="" xmlns:a14="http://schemas.microsoft.com/office/drawing/2010/main" w="9525">
+              <a14:hiddenLine xmlns:a14="http://schemas.microsoft.com/office/drawing/2010/main" w="9525">
                 <a:solidFill>
                   <a:schemeClr val="tx1"/>
                 </a:solidFill>
@@ -13134,7 +13134,7 @@
               </a14:hiddenLine>
             </a:ext>
             <a:ext uri="{AF507438-7753-43E0-B8FC-AC1667EBCBE1}">
-              <a14:hiddenEffects xmlns="" xmlns:a14="http://schemas.microsoft.com/office/drawing/2010/main">
+              <a14:hiddenEffects xmlns:a14="http://schemas.microsoft.com/office/drawing/2010/main">
                 <a:effectLst>
                   <a:outerShdw dist="35921" dir="2700000" algn="ctr" rotWithShape="0">
                     <a:schemeClr val="bg2"/>
@@ -13603,14 +13603,14 @@
           <a:ln/>
           <a:extLst>
             <a:ext uri="{909E8E84-426E-40DD-AFC4-6F175D3DCCD1}">
-              <a14:hiddenFill xmlns="" xmlns:a14="http://schemas.microsoft.com/office/drawing/2010/main">
+              <a14:hiddenFill xmlns:a14="http://schemas.microsoft.com/office/drawing/2010/main">
                 <a:solidFill>
                   <a:srgbClr val="FFFFFF"/>
                 </a:solidFill>
               </a14:hiddenFill>
             </a:ext>
             <a:ext uri="{91240B29-F687-4F45-9708-019B960494DF}">
-              <a14:hiddenLine xmlns="" xmlns:a14="http://schemas.microsoft.com/office/drawing/2010/main" w="9525">
+              <a14:hiddenLine xmlns:a14="http://schemas.microsoft.com/office/drawing/2010/main" w="9525">
                 <a:solidFill>
                   <a:srgbClr val="000000"/>
                 </a:solidFill>
@@ -13755,11 +13755,11 @@
               <a:rPr lang="en-US" sz="2400" dirty="0"/>
             </a:br>
             <a:r>
-              <a:rPr lang="en-US" sz="2400" dirty="0" err="1"/>
-              <a:t>Goutham</a:t>
-            </a:r>
-            <a:r>
-              <a:rPr lang="en-US" sz="2400" dirty="0"/>
+              <a:rPr lang="en-US" sz="2400" smtClean="0"/>
+              <a:t>Gautham</a:t>
+            </a:r>
+            <a:r>
+              <a:rPr lang="en-US" sz="2400" dirty="0" smtClean="0"/>
               <a:t> </a:t>
             </a:r>
             <a:r>
@@ -13896,14 +13896,14 @@
           <a:effectLst/>
           <a:extLst>
             <a:ext uri="{909E8E84-426E-40DD-AFC4-6F175D3DCCD1}">
-              <a14:hiddenFill xmlns="" xmlns:a14="http://schemas.microsoft.com/office/drawing/2010/main">
+              <a14:hiddenFill xmlns:a14="http://schemas.microsoft.com/office/drawing/2010/main">
                 <a:solidFill>
                   <a:schemeClr val="accent1"/>
                 </a:solidFill>
               </a14:hiddenFill>
             </a:ext>
             <a:ext uri="{91240B29-F687-4F45-9708-019B960494DF}">
-              <a14:hiddenLine xmlns="" xmlns:a14="http://schemas.microsoft.com/office/drawing/2010/main" w="9525">
+              <a14:hiddenLine xmlns:a14="http://schemas.microsoft.com/office/drawing/2010/main" w="9525">
                 <a:solidFill>
                   <a:schemeClr val="tx1"/>
                 </a:solidFill>
@@ -13913,7 +13913,7 @@
               </a14:hiddenLine>
             </a:ext>
             <a:ext uri="{AF507438-7753-43E0-B8FC-AC1667EBCBE1}">
-              <a14:hiddenEffects xmlns="" xmlns:a14="http://schemas.microsoft.com/office/drawing/2010/main">
+              <a14:hiddenEffects xmlns:a14="http://schemas.microsoft.com/office/drawing/2010/main">
                 <a:effectLst>
                   <a:outerShdw dist="35921" dir="2700000" algn="ctr" rotWithShape="0">
                     <a:schemeClr val="bg2"/>
@@ -14076,14 +14076,14 @@
           <a:ln/>
           <a:extLst>
             <a:ext uri="{909E8E84-426E-40DD-AFC4-6F175D3DCCD1}">
-              <a14:hiddenFill xmlns="" xmlns:a14="http://schemas.microsoft.com/office/drawing/2010/main">
+              <a14:hiddenFill xmlns:a14="http://schemas.microsoft.com/office/drawing/2010/main">
                 <a:solidFill>
                   <a:schemeClr val="accent1"/>
                 </a:solidFill>
               </a14:hiddenFill>
             </a:ext>
             <a:ext uri="{91240B29-F687-4F45-9708-019B960494DF}">
-              <a14:hiddenLine xmlns="" xmlns:a14="http://schemas.microsoft.com/office/drawing/2010/main" w="9525">
+              <a14:hiddenLine xmlns:a14="http://schemas.microsoft.com/office/drawing/2010/main" w="9525">
                 <a:solidFill>
                   <a:schemeClr val="tx1"/>
                 </a:solidFill>
@@ -14093,7 +14093,7 @@
               </a14:hiddenLine>
             </a:ext>
             <a:ext uri="{AF507438-7753-43E0-B8FC-AC1667EBCBE1}">
-              <a14:hiddenEffects xmlns="" xmlns:a14="http://schemas.microsoft.com/office/drawing/2010/main">
+              <a14:hiddenEffects xmlns:a14="http://schemas.microsoft.com/office/drawing/2010/main">
                 <a:effectLst>
                   <a:outerShdw dist="35921" dir="2700000" algn="ctr" rotWithShape="0">
                     <a:schemeClr val="bg2"/>
@@ -14133,7 +14133,7 @@
     </p:spTree>
     <p:extLst>
       <p:ext uri="{BB962C8B-B14F-4D97-AF65-F5344CB8AC3E}">
-        <p14:creationId xmlns="" xmlns:p14="http://schemas.microsoft.com/office/powerpoint/2010/main" val="2896510169"/>
+        <p14:creationId xmlns:p14="http://schemas.microsoft.com/office/powerpoint/2010/main" val="2896510169"/>
       </p:ext>
     </p:extLst>
   </p:cSld>
@@ -14340,7 +14340,7 @@
     </p:spTree>
     <p:extLst>
       <p:ext uri="{BB962C8B-B14F-4D97-AF65-F5344CB8AC3E}">
-        <p14:creationId xmlns="" xmlns:p14="http://schemas.microsoft.com/office/powerpoint/2010/main" val="2429929950"/>
+        <p14:creationId xmlns:p14="http://schemas.microsoft.com/office/powerpoint/2010/main" val="2429929950"/>
       </p:ext>
     </p:extLst>
   </p:cSld>
@@ -14393,14 +14393,14 @@
           <a:ln/>
           <a:extLst>
             <a:ext uri="{909E8E84-426E-40DD-AFC4-6F175D3DCCD1}">
-              <a14:hiddenFill xmlns="" xmlns:a14="http://schemas.microsoft.com/office/drawing/2010/main">
+              <a14:hiddenFill xmlns:a14="http://schemas.microsoft.com/office/drawing/2010/main">
                 <a:solidFill>
                   <a:schemeClr val="accent1"/>
                 </a:solidFill>
               </a14:hiddenFill>
             </a:ext>
             <a:ext uri="{91240B29-F687-4F45-9708-019B960494DF}">
-              <a14:hiddenLine xmlns="" xmlns:a14="http://schemas.microsoft.com/office/drawing/2010/main" w="9525">
+              <a14:hiddenLine xmlns:a14="http://schemas.microsoft.com/office/drawing/2010/main" w="9525">
                 <a:solidFill>
                   <a:schemeClr val="tx1"/>
                 </a:solidFill>
@@ -14410,7 +14410,7 @@
               </a14:hiddenLine>
             </a:ext>
             <a:ext uri="{AF507438-7753-43E0-B8FC-AC1667EBCBE1}">
-              <a14:hiddenEffects xmlns="" xmlns:a14="http://schemas.microsoft.com/office/drawing/2010/main">
+              <a14:hiddenEffects xmlns:a14="http://schemas.microsoft.com/office/drawing/2010/main">
                 <a:effectLst>
                   <a:outerShdw dist="35921" dir="2700000" algn="ctr" rotWithShape="0">
                     <a:schemeClr val="bg2"/>
@@ -14620,7 +14620,7 @@
     </p:spTree>
     <p:extLst>
       <p:ext uri="{BB962C8B-B14F-4D97-AF65-F5344CB8AC3E}">
-        <p14:creationId xmlns="" xmlns:p14="http://schemas.microsoft.com/office/powerpoint/2010/main" val="764352400"/>
+        <p14:creationId xmlns:p14="http://schemas.microsoft.com/office/powerpoint/2010/main" val="764352400"/>
       </p:ext>
     </p:extLst>
   </p:cSld>
@@ -14762,14 +14762,14 @@
           <a:effectLst/>
           <a:extLst>
             <a:ext uri="{909E8E84-426E-40DD-AFC4-6F175D3DCCD1}">
-              <a14:hiddenFill xmlns="" xmlns:a14="http://schemas.microsoft.com/office/drawing/2010/main">
+              <a14:hiddenFill xmlns:a14="http://schemas.microsoft.com/office/drawing/2010/main">
                 <a:solidFill>
                   <a:srgbClr val="FFFFFF"/>
                 </a:solidFill>
               </a14:hiddenFill>
             </a:ext>
             <a:ext uri="{AF507438-7753-43E0-B8FC-AC1667EBCBE1}">
-              <a14:hiddenEffects xmlns="" xmlns:a14="http://schemas.microsoft.com/office/drawing/2010/main">
+              <a14:hiddenEffects xmlns:a14="http://schemas.microsoft.com/office/drawing/2010/main">
                 <a:effectLst>
                   <a:outerShdw dist="35921" dir="2700000" algn="ctr" rotWithShape="0">
                     <a:srgbClr val="808080"/>
@@ -14843,14 +14843,14 @@
           <a:effectLst/>
           <a:extLst>
             <a:ext uri="{909E8E84-426E-40DD-AFC4-6F175D3DCCD1}">
-              <a14:hiddenFill xmlns="" xmlns:a14="http://schemas.microsoft.com/office/drawing/2010/main">
+              <a14:hiddenFill xmlns:a14="http://schemas.microsoft.com/office/drawing/2010/main">
                 <a:solidFill>
                   <a:srgbClr val="FFFFFF"/>
                 </a:solidFill>
               </a14:hiddenFill>
             </a:ext>
             <a:ext uri="{AF507438-7753-43E0-B8FC-AC1667EBCBE1}">
-              <a14:hiddenEffects xmlns="" xmlns:a14="http://schemas.microsoft.com/office/drawing/2010/main">
+              <a14:hiddenEffects xmlns:a14="http://schemas.microsoft.com/office/drawing/2010/main">
                 <a:effectLst>
                   <a:outerShdw dist="35921" dir="2700000" algn="ctr" rotWithShape="0">
                     <a:srgbClr val="808080"/>
@@ -14918,14 +14918,14 @@
           <a:effectLst/>
           <a:extLst>
             <a:ext uri="{909E8E84-426E-40DD-AFC4-6F175D3DCCD1}">
-              <a14:hiddenFill xmlns="" xmlns:a14="http://schemas.microsoft.com/office/drawing/2010/main">
+              <a14:hiddenFill xmlns:a14="http://schemas.microsoft.com/office/drawing/2010/main">
                 <a:solidFill>
                   <a:srgbClr val="FFFFFF"/>
                 </a:solidFill>
               </a14:hiddenFill>
             </a:ext>
             <a:ext uri="{AF507438-7753-43E0-B8FC-AC1667EBCBE1}">
-              <a14:hiddenEffects xmlns="" xmlns:a14="http://schemas.microsoft.com/office/drawing/2010/main">
+              <a14:hiddenEffects xmlns:a14="http://schemas.microsoft.com/office/drawing/2010/main">
                 <a:effectLst>
                   <a:outerShdw dist="35921" dir="2700000" algn="ctr" rotWithShape="0">
                     <a:srgbClr val="808080"/>
@@ -14999,14 +14999,14 @@
           <a:effectLst/>
           <a:extLst>
             <a:ext uri="{909E8E84-426E-40DD-AFC4-6F175D3DCCD1}">
-              <a14:hiddenFill xmlns="" xmlns:a14="http://schemas.microsoft.com/office/drawing/2010/main">
+              <a14:hiddenFill xmlns:a14="http://schemas.microsoft.com/office/drawing/2010/main">
                 <a:solidFill>
                   <a:srgbClr val="FFFFFF"/>
                 </a:solidFill>
               </a14:hiddenFill>
             </a:ext>
             <a:ext uri="{AF507438-7753-43E0-B8FC-AC1667EBCBE1}">
-              <a14:hiddenEffects xmlns="" xmlns:a14="http://schemas.microsoft.com/office/drawing/2010/main">
+              <a14:hiddenEffects xmlns:a14="http://schemas.microsoft.com/office/drawing/2010/main">
                 <a:effectLst>
                   <a:outerShdw dist="35921" dir="2700000" algn="ctr" rotWithShape="0">
                     <a:srgbClr val="808080"/>
@@ -15113,7 +15113,7 @@
     </p:spTree>
     <p:extLst>
       <p:ext uri="{BB962C8B-B14F-4D97-AF65-F5344CB8AC3E}">
-        <p14:creationId xmlns="" xmlns:p14="http://schemas.microsoft.com/office/powerpoint/2010/main" val="2501871751"/>
+        <p14:creationId xmlns:p14="http://schemas.microsoft.com/office/powerpoint/2010/main" val="2501871751"/>
       </p:ext>
     </p:extLst>
   </p:cSld>
@@ -15166,14 +15166,14 @@
           <a:ln/>
           <a:extLst>
             <a:ext uri="{909E8E84-426E-40DD-AFC4-6F175D3DCCD1}">
-              <a14:hiddenFill xmlns="" xmlns:a14="http://schemas.microsoft.com/office/drawing/2010/main">
+              <a14:hiddenFill xmlns:a14="http://schemas.microsoft.com/office/drawing/2010/main">
                 <a:solidFill>
                   <a:schemeClr val="accent1"/>
                 </a:solidFill>
               </a14:hiddenFill>
             </a:ext>
             <a:ext uri="{91240B29-F687-4F45-9708-019B960494DF}">
-              <a14:hiddenLine xmlns="" xmlns:a14="http://schemas.microsoft.com/office/drawing/2010/main" w="9525">
+              <a14:hiddenLine xmlns:a14="http://schemas.microsoft.com/office/drawing/2010/main" w="9525">
                 <a:solidFill>
                   <a:schemeClr val="tx1"/>
                 </a:solidFill>
@@ -15183,7 +15183,7 @@
               </a14:hiddenLine>
             </a:ext>
             <a:ext uri="{AF507438-7753-43E0-B8FC-AC1667EBCBE1}">
-              <a14:hiddenEffects xmlns="" xmlns:a14="http://schemas.microsoft.com/office/drawing/2010/main">
+              <a14:hiddenEffects xmlns:a14="http://schemas.microsoft.com/office/drawing/2010/main">
                 <a:effectLst>
                   <a:outerShdw dist="35921" dir="2700000" algn="ctr" rotWithShape="0">
                     <a:schemeClr val="bg2"/>
@@ -15372,7 +15372,7 @@
     </p:spTree>
     <p:extLst>
       <p:ext uri="{BB962C8B-B14F-4D97-AF65-F5344CB8AC3E}">
-        <p14:creationId xmlns="" xmlns:p14="http://schemas.microsoft.com/office/powerpoint/2010/main" val="4053586189"/>
+        <p14:creationId xmlns:p14="http://schemas.microsoft.com/office/powerpoint/2010/main" val="4053586189"/>
       </p:ext>
     </p:extLst>
   </p:cSld>
@@ -15420,7 +15420,7 @@
           <a:blip r:embed="rId2" cstate="print">
             <a:extLst>
               <a:ext uri="{28A0092B-C50C-407E-A947-70E740481C1C}">
-                <a14:useLocalDpi xmlns="" xmlns:a14="http://schemas.microsoft.com/office/drawing/2010/main" val="0"/>
+                <a14:useLocalDpi xmlns:a14="http://schemas.microsoft.com/office/drawing/2010/main" val="0"/>
               </a:ext>
             </a:extLst>
           </a:blip>
@@ -15476,7 +15476,7 @@
     </p:spTree>
     <p:extLst>
       <p:ext uri="{BB962C8B-B14F-4D97-AF65-F5344CB8AC3E}">
-        <p14:creationId xmlns="" xmlns:p14="http://schemas.microsoft.com/office/powerpoint/2010/main" val="2459363644"/>
+        <p14:creationId xmlns:p14="http://schemas.microsoft.com/office/powerpoint/2010/main" val="2459363644"/>
       </p:ext>
     </p:extLst>
   </p:cSld>
@@ -15669,7 +15669,7 @@
     </p:spTree>
     <p:extLst>
       <p:ext uri="{BB962C8B-B14F-4D97-AF65-F5344CB8AC3E}">
-        <p14:creationId xmlns="" xmlns:p14="http://schemas.microsoft.com/office/powerpoint/2010/main" val="3537114441"/>
+        <p14:creationId xmlns:p14="http://schemas.microsoft.com/office/powerpoint/2010/main" val="3537114441"/>
       </p:ext>
     </p:extLst>
   </p:cSld>
@@ -16020,7 +16020,7 @@
     </p:spTree>
     <p:extLst>
       <p:ext uri="{BB962C8B-B14F-4D97-AF65-F5344CB8AC3E}">
-        <p14:creationId xmlns="" xmlns:p14="http://schemas.microsoft.com/office/powerpoint/2010/main" val="2258079724"/>
+        <p14:creationId xmlns:p14="http://schemas.microsoft.com/office/powerpoint/2010/main" val="2258079724"/>
       </p:ext>
     </p:extLst>
   </p:cSld>
@@ -16433,7 +16433,7 @@
     </p:spTree>
     <p:extLst>
       <p:ext uri="{BB962C8B-B14F-4D97-AF65-F5344CB8AC3E}">
-        <p14:creationId xmlns="" xmlns:p14="http://schemas.microsoft.com/office/powerpoint/2010/main" val="1848986639"/>
+        <p14:creationId xmlns:p14="http://schemas.microsoft.com/office/powerpoint/2010/main" val="1848986639"/>
       </p:ext>
     </p:extLst>
   </p:cSld>
@@ -16509,7 +16509,7 @@
     </p:spTree>
     <p:extLst>
       <p:ext uri="{BB962C8B-B14F-4D97-AF65-F5344CB8AC3E}">
-        <p14:creationId xmlns="" xmlns:p14="http://schemas.microsoft.com/office/powerpoint/2010/main" val="268338712"/>
+        <p14:creationId xmlns:p14="http://schemas.microsoft.com/office/powerpoint/2010/main" val="268338712"/>
       </p:ext>
     </p:extLst>
   </p:cSld>
@@ -16566,14 +16566,14 @@
           <a:effectLst/>
           <a:extLst>
             <a:ext uri="{909E8E84-426E-40DD-AFC4-6F175D3DCCD1}">
-              <a14:hiddenFill xmlns="" xmlns:a14="http://schemas.microsoft.com/office/drawing/2010/main">
+              <a14:hiddenFill xmlns:a14="http://schemas.microsoft.com/office/drawing/2010/main">
                 <a:solidFill>
                   <a:schemeClr val="accent1"/>
                 </a:solidFill>
               </a14:hiddenFill>
             </a:ext>
             <a:ext uri="{91240B29-F687-4F45-9708-019B960494DF}">
-              <a14:hiddenLine xmlns="" xmlns:a14="http://schemas.microsoft.com/office/drawing/2010/main" w="9525">
+              <a14:hiddenLine xmlns:a14="http://schemas.microsoft.com/office/drawing/2010/main" w="9525">
                 <a:solidFill>
                   <a:schemeClr val="tx1"/>
                 </a:solidFill>
@@ -16583,7 +16583,7 @@
               </a14:hiddenLine>
             </a:ext>
             <a:ext uri="{AF507438-7753-43E0-B8FC-AC1667EBCBE1}">
-              <a14:hiddenEffects xmlns="" xmlns:a14="http://schemas.microsoft.com/office/drawing/2010/main">
+              <a14:hiddenEffects xmlns:a14="http://schemas.microsoft.com/office/drawing/2010/main">
                 <a:effectLst>
                   <a:outerShdw dist="35921" dir="2700000" algn="ctr" rotWithShape="0">
                     <a:schemeClr val="bg2"/>
@@ -16681,14 +16681,14 @@
           <a:ln/>
           <a:extLst>
             <a:ext uri="{909E8E84-426E-40DD-AFC4-6F175D3DCCD1}">
-              <a14:hiddenFill xmlns="" xmlns:a14="http://schemas.microsoft.com/office/drawing/2010/main">
+              <a14:hiddenFill xmlns:a14="http://schemas.microsoft.com/office/drawing/2010/main">
                 <a:solidFill>
                   <a:schemeClr val="accent1"/>
                 </a:solidFill>
               </a14:hiddenFill>
             </a:ext>
             <a:ext uri="{91240B29-F687-4F45-9708-019B960494DF}">
-              <a14:hiddenLine xmlns="" xmlns:a14="http://schemas.microsoft.com/office/drawing/2010/main" w="9525">
+              <a14:hiddenLine xmlns:a14="http://schemas.microsoft.com/office/drawing/2010/main" w="9525">
                 <a:solidFill>
                   <a:schemeClr val="tx1"/>
                 </a:solidFill>
@@ -16698,7 +16698,7 @@
               </a14:hiddenLine>
             </a:ext>
             <a:ext uri="{AF507438-7753-43E0-B8FC-AC1667EBCBE1}">
-              <a14:hiddenEffects xmlns="" xmlns:a14="http://schemas.microsoft.com/office/drawing/2010/main">
+              <a14:hiddenEffects xmlns:a14="http://schemas.microsoft.com/office/drawing/2010/main">
                 <a:effectLst>
                   <a:outerShdw dist="35921" dir="2700000" algn="ctr" rotWithShape="0">
                     <a:schemeClr val="bg2"/>
@@ -16850,14 +16850,14 @@
           <a:effectLst/>
           <a:extLst>
             <a:ext uri="{909E8E84-426E-40DD-AFC4-6F175D3DCCD1}">
-              <a14:hiddenFill xmlns="" xmlns:a14="http://schemas.microsoft.com/office/drawing/2010/main">
+              <a14:hiddenFill xmlns:a14="http://schemas.microsoft.com/office/drawing/2010/main">
                 <a:solidFill>
                   <a:schemeClr val="accent1"/>
                 </a:solidFill>
               </a14:hiddenFill>
             </a:ext>
             <a:ext uri="{91240B29-F687-4F45-9708-019B960494DF}">
-              <a14:hiddenLine xmlns="" xmlns:a14="http://schemas.microsoft.com/office/drawing/2010/main" w="9525">
+              <a14:hiddenLine xmlns:a14="http://schemas.microsoft.com/office/drawing/2010/main" w="9525">
                 <a:solidFill>
                   <a:schemeClr val="tx1"/>
                 </a:solidFill>
@@ -16867,7 +16867,7 @@
               </a14:hiddenLine>
             </a:ext>
             <a:ext uri="{AF507438-7753-43E0-B8FC-AC1667EBCBE1}">
-              <a14:hiddenEffects xmlns="" xmlns:a14="http://schemas.microsoft.com/office/drawing/2010/main">
+              <a14:hiddenEffects xmlns:a14="http://schemas.microsoft.com/office/drawing/2010/main">
                 <a:effectLst>
                   <a:outerShdw dist="35921" dir="2700000" algn="ctr" rotWithShape="0">
                     <a:schemeClr val="bg2"/>
@@ -17352,7 +17352,7 @@
     </p:spTree>
     <p:extLst>
       <p:ext uri="{BB962C8B-B14F-4D97-AF65-F5344CB8AC3E}">
-        <p14:creationId xmlns="" xmlns:p14="http://schemas.microsoft.com/office/powerpoint/2010/main" val="3938347196"/>
+        <p14:creationId xmlns:p14="http://schemas.microsoft.com/office/powerpoint/2010/main" val="3938347196"/>
       </p:ext>
     </p:extLst>
   </p:cSld>
@@ -17396,7 +17396,7 @@
             <p:ph idx="1"/>
             <p:extLst>
               <p:ext uri="{D42A27DB-BD31-4B8C-83A1-F6EECF244321}">
-                <p14:modId xmlns="" xmlns:p14="http://schemas.microsoft.com/office/powerpoint/2010/main" val="3545614197"/>
+                <p14:modId xmlns:p14="http://schemas.microsoft.com/office/powerpoint/2010/main" val="3545614197"/>
               </p:ext>
             </p:extLst>
           </p:nvPr>
@@ -17418,7 +17418,7 @@
           <p:nvPr>
             <p:extLst>
               <p:ext uri="{D42A27DB-BD31-4B8C-83A1-F6EECF244321}">
-                <p14:modId xmlns="" xmlns:p14="http://schemas.microsoft.com/office/powerpoint/2010/main" val="3850816241"/>
+                <p14:modId xmlns:p14="http://schemas.microsoft.com/office/powerpoint/2010/main" val="3850816241"/>
               </p:ext>
             </p:extLst>
           </p:nvPr>
@@ -17440,7 +17440,7 @@
           <p:nvPr>
             <p:extLst>
               <p:ext uri="{D42A27DB-BD31-4B8C-83A1-F6EECF244321}">
-                <p14:modId xmlns="" xmlns:p14="http://schemas.microsoft.com/office/powerpoint/2010/main" val="553989372"/>
+                <p14:modId xmlns:p14="http://schemas.microsoft.com/office/powerpoint/2010/main" val="553989372"/>
               </p:ext>
             </p:extLst>
           </p:nvPr>
@@ -17665,7 +17665,7 @@
     </p:spTree>
     <p:extLst>
       <p:ext uri="{BB962C8B-B14F-4D97-AF65-F5344CB8AC3E}">
-        <p14:creationId xmlns="" xmlns:p14="http://schemas.microsoft.com/office/powerpoint/2010/main" val="3459513994"/>
+        <p14:creationId xmlns:p14="http://schemas.microsoft.com/office/powerpoint/2010/main" val="3459513994"/>
       </p:ext>
     </p:extLst>
   </p:cSld>
@@ -17722,14 +17722,14 @@
           <a:effectLst/>
           <a:extLst>
             <a:ext uri="{909E8E84-426E-40DD-AFC4-6F175D3DCCD1}">
-              <a14:hiddenFill xmlns="" xmlns:a14="http://schemas.microsoft.com/office/drawing/2010/main">
+              <a14:hiddenFill xmlns:a14="http://schemas.microsoft.com/office/drawing/2010/main">
                 <a:solidFill>
                   <a:schemeClr val="accent1"/>
                 </a:solidFill>
               </a14:hiddenFill>
             </a:ext>
             <a:ext uri="{91240B29-F687-4F45-9708-019B960494DF}">
-              <a14:hiddenLine xmlns="" xmlns:a14="http://schemas.microsoft.com/office/drawing/2010/main" w="9525">
+              <a14:hiddenLine xmlns:a14="http://schemas.microsoft.com/office/drawing/2010/main" w="9525">
                 <a:solidFill>
                   <a:schemeClr val="tx1"/>
                 </a:solidFill>
@@ -17739,7 +17739,7 @@
               </a14:hiddenLine>
             </a:ext>
             <a:ext uri="{AF507438-7753-43E0-B8FC-AC1667EBCBE1}">
-              <a14:hiddenEffects xmlns="" xmlns:a14="http://schemas.microsoft.com/office/drawing/2010/main">
+              <a14:hiddenEffects xmlns:a14="http://schemas.microsoft.com/office/drawing/2010/main">
                 <a:effectLst>
                   <a:outerShdw dist="35921" dir="2700000" algn="ctr" rotWithShape="0">
                     <a:schemeClr val="bg2"/>
@@ -17803,14 +17803,14 @@
           <a:ln/>
           <a:extLst>
             <a:ext uri="{909E8E84-426E-40DD-AFC4-6F175D3DCCD1}">
-              <a14:hiddenFill xmlns="" xmlns:a14="http://schemas.microsoft.com/office/drawing/2010/main">
+              <a14:hiddenFill xmlns:a14="http://schemas.microsoft.com/office/drawing/2010/main">
                 <a:solidFill>
                   <a:schemeClr val="accent1"/>
                 </a:solidFill>
               </a14:hiddenFill>
             </a:ext>
             <a:ext uri="{91240B29-F687-4F45-9708-019B960494DF}">
-              <a14:hiddenLine xmlns="" xmlns:a14="http://schemas.microsoft.com/office/drawing/2010/main" w="9525">
+              <a14:hiddenLine xmlns:a14="http://schemas.microsoft.com/office/drawing/2010/main" w="9525">
                 <a:solidFill>
                   <a:schemeClr val="tx1"/>
                 </a:solidFill>
@@ -17820,7 +17820,7 @@
               </a14:hiddenLine>
             </a:ext>
             <a:ext uri="{AF507438-7753-43E0-B8FC-AC1667EBCBE1}">
-              <a14:hiddenEffects xmlns="" xmlns:a14="http://schemas.microsoft.com/office/drawing/2010/main">
+              <a14:hiddenEffects xmlns:a14="http://schemas.microsoft.com/office/drawing/2010/main">
                 <a:effectLst>
                   <a:outerShdw dist="35921" dir="2700000" algn="ctr" rotWithShape="0">
                     <a:schemeClr val="bg2"/>
@@ -17992,7 +17992,7 @@
     </p:spTree>
     <p:extLst>
       <p:ext uri="{BB962C8B-B14F-4D97-AF65-F5344CB8AC3E}">
-        <p14:creationId xmlns="" xmlns:p14="http://schemas.microsoft.com/office/powerpoint/2010/main" val="2361427633"/>
+        <p14:creationId xmlns:p14="http://schemas.microsoft.com/office/powerpoint/2010/main" val="2361427633"/>
       </p:ext>
     </p:extLst>
   </p:cSld>
@@ -18541,14 +18541,14 @@
         <a:effectLst/>
         <a:extLst>
           <a:ext uri="{909E8E84-426E-40DD-AFC4-6F175D3DCCD1}">
-            <a14:hiddenFill xmlns="" xmlns:a14="http://schemas.microsoft.com/office/drawing/2010/main">
+            <a14:hiddenFill xmlns:a14="http://schemas.microsoft.com/office/drawing/2010/main">
               <a:solidFill>
                 <a:srgbClr val="FFFFFF"/>
               </a:solidFill>
             </a14:hiddenFill>
           </a:ext>
           <a:ext uri="{AF507438-7753-43E0-B8FC-AC1667EBCBE1}">
-            <a14:hiddenEffects xmlns="" xmlns:a14="http://schemas.microsoft.com/office/drawing/2010/main">
+            <a14:hiddenEffects xmlns:a14="http://schemas.microsoft.com/office/drawing/2010/main">
               <a:effectLst>
                 <a:outerShdw dist="35921" dir="2700000" algn="ctr" rotWithShape="0">
                   <a:srgbClr val="808080"/>
@@ -18619,14 +18619,14 @@
         <a:effectLst/>
         <a:extLst>
           <a:ext uri="{909E8E84-426E-40DD-AFC4-6F175D3DCCD1}">
-            <a14:hiddenFill xmlns="" xmlns:a14="http://schemas.microsoft.com/office/drawing/2010/main">
+            <a14:hiddenFill xmlns:a14="http://schemas.microsoft.com/office/drawing/2010/main">
               <a:solidFill>
                 <a:srgbClr val="FFFFFF"/>
               </a:solidFill>
             </a14:hiddenFill>
           </a:ext>
           <a:ext uri="{AF507438-7753-43E0-B8FC-AC1667EBCBE1}">
-            <a14:hiddenEffects xmlns="" xmlns:a14="http://schemas.microsoft.com/office/drawing/2010/main">
+            <a14:hiddenEffects xmlns:a14="http://schemas.microsoft.com/office/drawing/2010/main">
               <a:effectLst>
                 <a:outerShdw dist="35921" dir="2700000" algn="ctr" rotWithShape="0">
                   <a:srgbClr val="808080"/>
@@ -18962,7 +18962,7 @@
   </a:extraClrSchemeLst>
   <a:extLst>
     <a:ext uri="{05A4C25C-085E-4340-85A3-A5531E510DB2}">
-      <thm15:themeFamily xmlns="" xmlns:thm15="http://schemas.microsoft.com/office/thememl/2012/main" name="Office Theme" id="{62F939B6-93AF-4DB8-9C6B-D6C7DFDC589F}" vid="{4A3C46E8-61CC-4603-A589-7422A47A8E4A}"/>
+      <thm15:themeFamily xmlns:thm15="http://schemas.microsoft.com/office/thememl/2012/main" name="Office Theme" id="{62F939B6-93AF-4DB8-9C6B-D6C7DFDC589F}" vid="{4A3C46E8-61CC-4603-A589-7422A47A8E4A}"/>
     </a:ext>
   </a:extLst>
 </a:theme>
@@ -19187,14 +19187,14 @@
         <a:effectLst/>
         <a:extLst>
           <a:ext uri="{909E8E84-426E-40DD-AFC4-6F175D3DCCD1}">
-            <a14:hiddenFill xmlns="" xmlns:a14="http://schemas.microsoft.com/office/drawing/2010/main">
+            <a14:hiddenFill xmlns:a14="http://schemas.microsoft.com/office/drawing/2010/main">
               <a:solidFill>
                 <a:srgbClr val="FFFFFF"/>
               </a:solidFill>
             </a14:hiddenFill>
           </a:ext>
           <a:ext uri="{AF507438-7753-43E0-B8FC-AC1667EBCBE1}">
-            <a14:hiddenEffects xmlns="" xmlns:a14="http://schemas.microsoft.com/office/drawing/2010/main">
+            <a14:hiddenEffects xmlns:a14="http://schemas.microsoft.com/office/drawing/2010/main">
               <a:effectLst>
                 <a:outerShdw dist="35921" dir="2700000" algn="ctr" rotWithShape="0">
                   <a:srgbClr val="808080"/>
@@ -19265,14 +19265,14 @@
         <a:effectLst/>
         <a:extLst>
           <a:ext uri="{909E8E84-426E-40DD-AFC4-6F175D3DCCD1}">
-            <a14:hiddenFill xmlns="" xmlns:a14="http://schemas.microsoft.com/office/drawing/2010/main">
+            <a14:hiddenFill xmlns:a14="http://schemas.microsoft.com/office/drawing/2010/main">
               <a:solidFill>
                 <a:srgbClr val="FFFFFF"/>
               </a:solidFill>
             </a14:hiddenFill>
           </a:ext>
           <a:ext uri="{AF507438-7753-43E0-B8FC-AC1667EBCBE1}">
-            <a14:hiddenEffects xmlns="" xmlns:a14="http://schemas.microsoft.com/office/drawing/2010/main">
+            <a14:hiddenEffects xmlns:a14="http://schemas.microsoft.com/office/drawing/2010/main">
               <a:effectLst>
                 <a:outerShdw dist="35921" dir="2700000" algn="ctr" rotWithShape="0">
                   <a:srgbClr val="808080"/>
@@ -19813,7 +19813,7 @@
   </a:extraClrSchemeLst>
   <a:extLst>
     <a:ext uri="{05A4C25C-085E-4340-85A3-A5531E510DB2}">
-      <thm15:themeFamily xmlns="" xmlns:thm15="http://schemas.microsoft.com/office/thememl/2012/main" name="Office Theme" id="{62F939B6-93AF-4DB8-9C6B-D6C7DFDC589F}" vid="{4A3C46E8-61CC-4603-A589-7422A47A8E4A}"/>
+      <thm15:themeFamily xmlns:thm15="http://schemas.microsoft.com/office/thememl/2012/main" name="Office Theme" id="{62F939B6-93AF-4DB8-9C6B-D6C7DFDC589F}" vid="{4A3C46E8-61CC-4603-A589-7422A47A8E4A}"/>
     </a:ext>
   </a:extLst>
 </a:theme>
@@ -20074,7 +20074,7 @@
   <a:extraClrSchemeLst/>
   <a:extLst>
     <a:ext uri="{05A4C25C-085E-4340-85A3-A5531E510DB2}">
-      <thm15:themeFamily xmlns="" xmlns:thm15="http://schemas.microsoft.com/office/thememl/2012/main" name="Office Theme" id="{62F939B6-93AF-4DB8-9C6B-D6C7DFDC589F}" vid="{4A3C46E8-61CC-4603-A589-7422A47A8E4A}"/>
+      <thm15:themeFamily xmlns:thm15="http://schemas.microsoft.com/office/thememl/2012/main" name="Office Theme" id="{62F939B6-93AF-4DB8-9C6B-D6C7DFDC589F}" vid="{4A3C46E8-61CC-4603-A589-7422A47A8E4A}"/>
     </a:ext>
   </a:extLst>
 </a:theme>
@@ -20335,7 +20335,7 @@
   <a:extraClrSchemeLst/>
   <a:extLst>
     <a:ext uri="{05A4C25C-085E-4340-85A3-A5531E510DB2}">
-      <thm15:themeFamily xmlns="" xmlns:thm15="http://schemas.microsoft.com/office/thememl/2012/main" name="Office Theme" id="{62F939B6-93AF-4DB8-9C6B-D6C7DFDC589F}" vid="{4A3C46E8-61CC-4603-A589-7422A47A8E4A}"/>
+      <thm15:themeFamily xmlns:thm15="http://schemas.microsoft.com/office/thememl/2012/main" name="Office Theme" id="{62F939B6-93AF-4DB8-9C6B-D6C7DFDC589F}" vid="{4A3C46E8-61CC-4603-A589-7422A47A8E4A}"/>
     </a:ext>
   </a:extLst>
 </a:theme>

</xml_diff>